<commit_message>
docs: TCP/IP 추가 정리 중
</commit_message>
<xml_diff>
--- a/네트워크/네트워크_이미지.pptx
+++ b/네트워크/네트워크_이미지.pptx
@@ -6,6 +6,7 @@
   </p:sldMasterIdLst>
   <p:sldIdLst>
     <p:sldId id="256" r:id="rId2"/>
+    <p:sldId id="257" r:id="rId3"/>
   </p:sldIdLst>
   <p:sldSz cx="12192000" cy="6858000"/>
   <p:notesSz cx="6858000" cy="9144000"/>
@@ -104,6 +105,11 @@
       </a:defRPr>
     </a:lvl9pPr>
   </p:defaultTextStyle>
+  <p:extLst>
+    <p:ext uri="{EFAFB233-063F-42B5-8137-9DF3F51BA10A}">
+      <p15:sldGuideLst xmlns:p15="http://schemas.microsoft.com/office/powerpoint/2012/main"/>
+    </p:ext>
+  </p:extLst>
 </p:presentation>
 </file>
 
@@ -238,7 +244,7 @@
           <a:p>
             <a:fld id="{DDADF25A-EE26-4DE4-A852-32D1A785266A}" type="datetimeFigureOut">
               <a:rPr lang="ko-KR" altLang="en-US" smtClean="0"/>
-              <a:t>2023-11-05</a:t>
+              <a:t>2024-05-20</a:t>
             </a:fld>
             <a:endParaRPr lang="ko-KR" altLang="en-US"/>
           </a:p>
@@ -408,7 +414,7 @@
           <a:p>
             <a:fld id="{DDADF25A-EE26-4DE4-A852-32D1A785266A}" type="datetimeFigureOut">
               <a:rPr lang="ko-KR" altLang="en-US" smtClean="0"/>
-              <a:t>2023-11-05</a:t>
+              <a:t>2024-05-20</a:t>
             </a:fld>
             <a:endParaRPr lang="ko-KR" altLang="en-US"/>
           </a:p>
@@ -588,7 +594,7 @@
           <a:p>
             <a:fld id="{DDADF25A-EE26-4DE4-A852-32D1A785266A}" type="datetimeFigureOut">
               <a:rPr lang="ko-KR" altLang="en-US" smtClean="0"/>
-              <a:t>2023-11-05</a:t>
+              <a:t>2024-05-20</a:t>
             </a:fld>
             <a:endParaRPr lang="ko-KR" altLang="en-US"/>
           </a:p>
@@ -758,7 +764,7 @@
           <a:p>
             <a:fld id="{DDADF25A-EE26-4DE4-A852-32D1A785266A}" type="datetimeFigureOut">
               <a:rPr lang="ko-KR" altLang="en-US" smtClean="0"/>
-              <a:t>2023-11-05</a:t>
+              <a:t>2024-05-20</a:t>
             </a:fld>
             <a:endParaRPr lang="ko-KR" altLang="en-US"/>
           </a:p>
@@ -1004,7 +1010,7 @@
           <a:p>
             <a:fld id="{DDADF25A-EE26-4DE4-A852-32D1A785266A}" type="datetimeFigureOut">
               <a:rPr lang="ko-KR" altLang="en-US" smtClean="0"/>
-              <a:t>2023-11-05</a:t>
+              <a:t>2024-05-20</a:t>
             </a:fld>
             <a:endParaRPr lang="ko-KR" altLang="en-US"/>
           </a:p>
@@ -1236,7 +1242,7 @@
           <a:p>
             <a:fld id="{DDADF25A-EE26-4DE4-A852-32D1A785266A}" type="datetimeFigureOut">
               <a:rPr lang="ko-KR" altLang="en-US" smtClean="0"/>
-              <a:t>2023-11-05</a:t>
+              <a:t>2024-05-20</a:t>
             </a:fld>
             <a:endParaRPr lang="ko-KR" altLang="en-US"/>
           </a:p>
@@ -1603,7 +1609,7 @@
           <a:p>
             <a:fld id="{DDADF25A-EE26-4DE4-A852-32D1A785266A}" type="datetimeFigureOut">
               <a:rPr lang="ko-KR" altLang="en-US" smtClean="0"/>
-              <a:t>2023-11-05</a:t>
+              <a:t>2024-05-20</a:t>
             </a:fld>
             <a:endParaRPr lang="ko-KR" altLang="en-US"/>
           </a:p>
@@ -1721,7 +1727,7 @@
           <a:p>
             <a:fld id="{DDADF25A-EE26-4DE4-A852-32D1A785266A}" type="datetimeFigureOut">
               <a:rPr lang="ko-KR" altLang="en-US" smtClean="0"/>
-              <a:t>2023-11-05</a:t>
+              <a:t>2024-05-20</a:t>
             </a:fld>
             <a:endParaRPr lang="ko-KR" altLang="en-US"/>
           </a:p>
@@ -1816,7 +1822,7 @@
           <a:p>
             <a:fld id="{DDADF25A-EE26-4DE4-A852-32D1A785266A}" type="datetimeFigureOut">
               <a:rPr lang="ko-KR" altLang="en-US" smtClean="0"/>
-              <a:t>2023-11-05</a:t>
+              <a:t>2024-05-20</a:t>
             </a:fld>
             <a:endParaRPr lang="ko-KR" altLang="en-US"/>
           </a:p>
@@ -2093,7 +2099,7 @@
           <a:p>
             <a:fld id="{DDADF25A-EE26-4DE4-A852-32D1A785266A}" type="datetimeFigureOut">
               <a:rPr lang="ko-KR" altLang="en-US" smtClean="0"/>
-              <a:t>2023-11-05</a:t>
+              <a:t>2024-05-20</a:t>
             </a:fld>
             <a:endParaRPr lang="ko-KR" altLang="en-US"/>
           </a:p>
@@ -2346,7 +2352,7 @@
           <a:p>
             <a:fld id="{DDADF25A-EE26-4DE4-A852-32D1A785266A}" type="datetimeFigureOut">
               <a:rPr lang="ko-KR" altLang="en-US" smtClean="0"/>
-              <a:t>2023-11-05</a:t>
+              <a:t>2024-05-20</a:t>
             </a:fld>
             <a:endParaRPr lang="ko-KR" altLang="en-US"/>
           </a:p>
@@ -2559,7 +2565,7 @@
           <a:p>
             <a:fld id="{DDADF25A-EE26-4DE4-A852-32D1A785266A}" type="datetimeFigureOut">
               <a:rPr lang="ko-KR" altLang="en-US" smtClean="0"/>
-              <a:t>2023-11-05</a:t>
+              <a:t>2024-05-20</a:t>
             </a:fld>
             <a:endParaRPr lang="ko-KR" altLang="en-US"/>
           </a:p>
@@ -4942,10 +4948,4006 @@
           </a:p>
         </p:txBody>
       </p:sp>
+      <p:grpSp>
+        <p:nvGrpSpPr>
+          <p:cNvPr id="44" name="그룹 43"/>
+          <p:cNvGrpSpPr/>
+          <p:nvPr/>
+        </p:nvGrpSpPr>
+        <p:grpSpPr>
+          <a:xfrm>
+            <a:off x="2734529" y="1543216"/>
+            <a:ext cx="8513099" cy="4755854"/>
+            <a:chOff x="1357673" y="1517904"/>
+            <a:chExt cx="8513099" cy="4755854"/>
+          </a:xfrm>
+        </p:grpSpPr>
+        <p:sp>
+          <p:nvSpPr>
+            <p:cNvPr id="45" name="타원 44"/>
+            <p:cNvSpPr/>
+            <p:nvPr/>
+          </p:nvSpPr>
+          <p:spPr>
+            <a:xfrm>
+              <a:off x="5596911" y="1517904"/>
+              <a:ext cx="540000" cy="540000"/>
+            </a:xfrm>
+            <a:prstGeom prst="ellipse">
+              <a:avLst/>
+            </a:prstGeom>
+            <a:solidFill>
+              <a:srgbClr val="1CC9E4"/>
+            </a:solidFill>
+            <a:ln>
+              <a:solidFill>
+                <a:schemeClr val="tx1"/>
+              </a:solidFill>
+            </a:ln>
+          </p:spPr>
+          <p:style>
+            <a:lnRef idx="2">
+              <a:schemeClr val="accent1">
+                <a:shade val="50000"/>
+              </a:schemeClr>
+            </a:lnRef>
+            <a:fillRef idx="1">
+              <a:schemeClr val="accent1"/>
+            </a:fillRef>
+            <a:effectRef idx="0">
+              <a:schemeClr val="accent1"/>
+            </a:effectRef>
+            <a:fontRef idx="minor">
+              <a:schemeClr val="lt1"/>
+            </a:fontRef>
+          </p:style>
+          <p:txBody>
+            <a:bodyPr lIns="0" tIns="0" rIns="0" bIns="0" rtlCol="0" anchor="ctr"/>
+            <a:lstStyle/>
+            <a:p>
+              <a:pPr algn="ctr"/>
+              <a:r>
+                <a:rPr lang="en-US" altLang="ko-KR" sz="1200" dirty="0" smtClean="0">
+                  <a:solidFill>
+                    <a:schemeClr val="bg1"/>
+                  </a:solidFill>
+                  <a:latin typeface="삼성긴고딕OTF Medium" panose="020B0600000101010101" pitchFamily="34" charset="-127"/>
+                  <a:ea typeface="삼성긴고딕OTF Medium" panose="020B0600000101010101" pitchFamily="34" charset="-127"/>
+                </a:rPr>
+                <a:t>0 – 9</a:t>
+              </a:r>
+              <a:br>
+                <a:rPr lang="en-US" altLang="ko-KR" sz="1200" dirty="0" smtClean="0">
+                  <a:solidFill>
+                    <a:schemeClr val="bg1"/>
+                  </a:solidFill>
+                  <a:latin typeface="삼성긴고딕OTF Medium" panose="020B0600000101010101" pitchFamily="34" charset="-127"/>
+                  <a:ea typeface="삼성긴고딕OTF Medium" panose="020B0600000101010101" pitchFamily="34" charset="-127"/>
+                </a:rPr>
+              </a:br>
+              <a:r>
+                <a:rPr lang="en-US" altLang="ko-KR" sz="1200" dirty="0" smtClean="0">
+                  <a:solidFill>
+                    <a:srgbClr val="FF0000"/>
+                  </a:solidFill>
+                  <a:latin typeface="삼성긴고딕OTF Medium" panose="020B0600000101010101" pitchFamily="34" charset="-127"/>
+                  <a:ea typeface="삼성긴고딕OTF Medium" panose="020B0600000101010101" pitchFamily="34" charset="-127"/>
+                </a:rPr>
+                <a:t>57</a:t>
+              </a:r>
+              <a:endParaRPr lang="ko-KR" altLang="en-US" sz="1200" dirty="0">
+                <a:solidFill>
+                  <a:srgbClr val="FF0000"/>
+                </a:solidFill>
+                <a:latin typeface="삼성긴고딕OTF Medium" panose="020B0600000101010101" pitchFamily="34" charset="-127"/>
+                <a:ea typeface="삼성긴고딕OTF Medium" panose="020B0600000101010101" pitchFamily="34" charset="-127"/>
+              </a:endParaRPr>
+            </a:p>
+          </p:txBody>
+        </p:sp>
+        <p:sp>
+          <p:nvSpPr>
+            <p:cNvPr id="46" name="타원 45"/>
+            <p:cNvSpPr/>
+            <p:nvPr/>
+          </p:nvSpPr>
+          <p:spPr>
+            <a:xfrm>
+              <a:off x="3477579" y="2675342"/>
+              <a:ext cx="540000" cy="540000"/>
+            </a:xfrm>
+            <a:prstGeom prst="ellipse">
+              <a:avLst/>
+            </a:prstGeom>
+            <a:solidFill>
+              <a:srgbClr val="1CC9E4"/>
+            </a:solidFill>
+            <a:ln>
+              <a:solidFill>
+                <a:schemeClr val="tx1"/>
+              </a:solidFill>
+            </a:ln>
+          </p:spPr>
+          <p:style>
+            <a:lnRef idx="2">
+              <a:schemeClr val="accent1">
+                <a:shade val="50000"/>
+              </a:schemeClr>
+            </a:lnRef>
+            <a:fillRef idx="1">
+              <a:schemeClr val="accent1"/>
+            </a:fillRef>
+            <a:effectRef idx="0">
+              <a:schemeClr val="accent1"/>
+            </a:effectRef>
+            <a:fontRef idx="minor">
+              <a:schemeClr val="lt1"/>
+            </a:fontRef>
+          </p:style>
+          <p:txBody>
+            <a:bodyPr lIns="0" tIns="0" rIns="0" bIns="0" rtlCol="0" anchor="ctr"/>
+            <a:lstStyle/>
+            <a:p>
+              <a:pPr algn="ctr"/>
+              <a:r>
+                <a:rPr lang="en-US" altLang="ko-KR" sz="1200" dirty="0" smtClean="0">
+                  <a:solidFill>
+                    <a:schemeClr val="bg1"/>
+                  </a:solidFill>
+                  <a:latin typeface="삼성긴고딕OTF Medium" panose="020B0600000101010101" pitchFamily="34" charset="-127"/>
+                  <a:ea typeface="삼성긴고딕OTF Medium" panose="020B0600000101010101" pitchFamily="34" charset="-127"/>
+                </a:rPr>
+                <a:t>0 – 4</a:t>
+              </a:r>
+              <a:br>
+                <a:rPr lang="en-US" altLang="ko-KR" sz="1200" dirty="0" smtClean="0">
+                  <a:solidFill>
+                    <a:schemeClr val="bg1"/>
+                  </a:solidFill>
+                  <a:latin typeface="삼성긴고딕OTF Medium" panose="020B0600000101010101" pitchFamily="34" charset="-127"/>
+                  <a:ea typeface="삼성긴고딕OTF Medium" panose="020B0600000101010101" pitchFamily="34" charset="-127"/>
+                </a:rPr>
+              </a:br>
+              <a:r>
+                <a:rPr lang="en-US" altLang="ko-KR" sz="1200" dirty="0" smtClean="0">
+                  <a:solidFill>
+                    <a:srgbClr val="FF0000"/>
+                  </a:solidFill>
+                  <a:latin typeface="삼성긴고딕OTF Medium" panose="020B0600000101010101" pitchFamily="34" charset="-127"/>
+                  <a:ea typeface="삼성긴고딕OTF Medium" panose="020B0600000101010101" pitchFamily="34" charset="-127"/>
+                </a:rPr>
+                <a:t>23</a:t>
+              </a:r>
+              <a:endParaRPr lang="ko-KR" altLang="en-US" sz="1200" dirty="0">
+                <a:solidFill>
+                  <a:srgbClr val="FF0000"/>
+                </a:solidFill>
+                <a:latin typeface="삼성긴고딕OTF Medium" panose="020B0600000101010101" pitchFamily="34" charset="-127"/>
+                <a:ea typeface="삼성긴고딕OTF Medium" panose="020B0600000101010101" pitchFamily="34" charset="-127"/>
+              </a:endParaRPr>
+            </a:p>
+          </p:txBody>
+        </p:sp>
+        <p:sp>
+          <p:nvSpPr>
+            <p:cNvPr id="47" name="타원 46"/>
+            <p:cNvSpPr/>
+            <p:nvPr/>
+          </p:nvSpPr>
+          <p:spPr>
+            <a:xfrm>
+              <a:off x="7716242" y="2675342"/>
+              <a:ext cx="540000" cy="540000"/>
+            </a:xfrm>
+            <a:prstGeom prst="ellipse">
+              <a:avLst/>
+            </a:prstGeom>
+            <a:solidFill>
+              <a:srgbClr val="1CC9E4"/>
+            </a:solidFill>
+            <a:ln>
+              <a:solidFill>
+                <a:schemeClr val="tx1"/>
+              </a:solidFill>
+            </a:ln>
+          </p:spPr>
+          <p:style>
+            <a:lnRef idx="2">
+              <a:schemeClr val="accent1">
+                <a:shade val="50000"/>
+              </a:schemeClr>
+            </a:lnRef>
+            <a:fillRef idx="1">
+              <a:schemeClr val="accent1"/>
+            </a:fillRef>
+            <a:effectRef idx="0">
+              <a:schemeClr val="accent1"/>
+            </a:effectRef>
+            <a:fontRef idx="minor">
+              <a:schemeClr val="lt1"/>
+            </a:fontRef>
+          </p:style>
+          <p:txBody>
+            <a:bodyPr lIns="0" tIns="0" rIns="0" bIns="0" rtlCol="0" anchor="ctr"/>
+            <a:lstStyle/>
+            <a:p>
+              <a:pPr algn="ctr"/>
+              <a:r>
+                <a:rPr lang="en-US" altLang="ko-KR" sz="1200" dirty="0">
+                  <a:solidFill>
+                    <a:schemeClr val="bg1"/>
+                  </a:solidFill>
+                  <a:latin typeface="삼성긴고딕OTF Medium" panose="020B0600000101010101" pitchFamily="34" charset="-127"/>
+                  <a:ea typeface="삼성긴고딕OTF Medium" panose="020B0600000101010101" pitchFamily="34" charset="-127"/>
+                </a:rPr>
+                <a:t>5</a:t>
+              </a:r>
+              <a:r>
+                <a:rPr lang="en-US" altLang="ko-KR" sz="1200" dirty="0" smtClean="0">
+                  <a:solidFill>
+                    <a:schemeClr val="bg1"/>
+                  </a:solidFill>
+                  <a:latin typeface="삼성긴고딕OTF Medium" panose="020B0600000101010101" pitchFamily="34" charset="-127"/>
+                  <a:ea typeface="삼성긴고딕OTF Medium" panose="020B0600000101010101" pitchFamily="34" charset="-127"/>
+                </a:rPr>
+                <a:t> – 9</a:t>
+              </a:r>
+              <a:br>
+                <a:rPr lang="en-US" altLang="ko-KR" sz="1200" dirty="0" smtClean="0">
+                  <a:solidFill>
+                    <a:schemeClr val="bg1"/>
+                  </a:solidFill>
+                  <a:latin typeface="삼성긴고딕OTF Medium" panose="020B0600000101010101" pitchFamily="34" charset="-127"/>
+                  <a:ea typeface="삼성긴고딕OTF Medium" panose="020B0600000101010101" pitchFamily="34" charset="-127"/>
+                </a:rPr>
+              </a:br>
+              <a:r>
+                <a:rPr lang="en-US" altLang="ko-KR" sz="1200" dirty="0" smtClean="0">
+                  <a:solidFill>
+                    <a:srgbClr val="FF0000"/>
+                  </a:solidFill>
+                  <a:latin typeface="삼성긴고딕OTF Medium" panose="020B0600000101010101" pitchFamily="34" charset="-127"/>
+                  <a:ea typeface="삼성긴고딕OTF Medium" panose="020B0600000101010101" pitchFamily="34" charset="-127"/>
+                </a:rPr>
+                <a:t>34</a:t>
+              </a:r>
+              <a:endParaRPr lang="ko-KR" altLang="en-US" sz="1200" dirty="0">
+                <a:solidFill>
+                  <a:srgbClr val="FF0000"/>
+                </a:solidFill>
+                <a:latin typeface="삼성긴고딕OTF Medium" panose="020B0600000101010101" pitchFamily="34" charset="-127"/>
+                <a:ea typeface="삼성긴고딕OTF Medium" panose="020B0600000101010101" pitchFamily="34" charset="-127"/>
+              </a:endParaRPr>
+            </a:p>
+          </p:txBody>
+        </p:sp>
+        <p:sp>
+          <p:nvSpPr>
+            <p:cNvPr id="48" name="타원 47"/>
+            <p:cNvSpPr/>
+            <p:nvPr/>
+          </p:nvSpPr>
+          <p:spPr>
+            <a:xfrm>
+              <a:off x="2479081" y="3891494"/>
+              <a:ext cx="540000" cy="540000"/>
+            </a:xfrm>
+            <a:prstGeom prst="ellipse">
+              <a:avLst/>
+            </a:prstGeom>
+            <a:solidFill>
+              <a:srgbClr val="E62154"/>
+            </a:solidFill>
+            <a:ln>
+              <a:solidFill>
+                <a:schemeClr val="tx1"/>
+              </a:solidFill>
+            </a:ln>
+          </p:spPr>
+          <p:style>
+            <a:lnRef idx="2">
+              <a:schemeClr val="accent1">
+                <a:shade val="50000"/>
+              </a:schemeClr>
+            </a:lnRef>
+            <a:fillRef idx="1">
+              <a:schemeClr val="accent1"/>
+            </a:fillRef>
+            <a:effectRef idx="0">
+              <a:schemeClr val="accent1"/>
+            </a:effectRef>
+            <a:fontRef idx="minor">
+              <a:schemeClr val="lt1"/>
+            </a:fontRef>
+          </p:style>
+          <p:txBody>
+            <a:bodyPr lIns="0" tIns="0" rIns="0" bIns="0" rtlCol="0" anchor="ctr"/>
+            <a:lstStyle/>
+            <a:p>
+              <a:pPr algn="ctr"/>
+              <a:r>
+                <a:rPr lang="en-US" altLang="ko-KR" sz="1200" dirty="0" smtClean="0">
+                  <a:solidFill>
+                    <a:schemeClr val="bg1"/>
+                  </a:solidFill>
+                  <a:latin typeface="삼성긴고딕OTF Medium" panose="020B0600000101010101" pitchFamily="34" charset="-127"/>
+                  <a:ea typeface="삼성긴고딕OTF Medium" panose="020B0600000101010101" pitchFamily="34" charset="-127"/>
+                </a:rPr>
+                <a:t>0 – 2</a:t>
+              </a:r>
+              <a:br>
+                <a:rPr lang="en-US" altLang="ko-KR" sz="1200" dirty="0" smtClean="0">
+                  <a:solidFill>
+                    <a:schemeClr val="bg1"/>
+                  </a:solidFill>
+                  <a:latin typeface="삼성긴고딕OTF Medium" panose="020B0600000101010101" pitchFamily="34" charset="-127"/>
+                  <a:ea typeface="삼성긴고딕OTF Medium" panose="020B0600000101010101" pitchFamily="34" charset="-127"/>
+                </a:rPr>
+              </a:br>
+              <a:r>
+                <a:rPr lang="en-US" altLang="ko-KR" sz="1200" dirty="0" smtClean="0">
+                  <a:solidFill>
+                    <a:schemeClr val="bg2">
+                      <a:lumMod val="90000"/>
+                    </a:schemeClr>
+                  </a:solidFill>
+                  <a:latin typeface="삼성긴고딕OTF Medium" panose="020B0600000101010101" pitchFamily="34" charset="-127"/>
+                  <a:ea typeface="삼성긴고딕OTF Medium" panose="020B0600000101010101" pitchFamily="34" charset="-127"/>
+                </a:rPr>
+                <a:t>11</a:t>
+              </a:r>
+              <a:endParaRPr lang="ko-KR" altLang="en-US" sz="1200" dirty="0">
+                <a:solidFill>
+                  <a:schemeClr val="bg2">
+                    <a:lumMod val="90000"/>
+                  </a:schemeClr>
+                </a:solidFill>
+                <a:latin typeface="삼성긴고딕OTF Medium" panose="020B0600000101010101" pitchFamily="34" charset="-127"/>
+                <a:ea typeface="삼성긴고딕OTF Medium" panose="020B0600000101010101" pitchFamily="34" charset="-127"/>
+              </a:endParaRPr>
+            </a:p>
+          </p:txBody>
+        </p:sp>
+        <p:sp>
+          <p:nvSpPr>
+            <p:cNvPr id="49" name="타원 48"/>
+            <p:cNvSpPr/>
+            <p:nvPr/>
+          </p:nvSpPr>
+          <p:spPr>
+            <a:xfrm>
+              <a:off x="4476077" y="3892468"/>
+              <a:ext cx="540000" cy="540000"/>
+            </a:xfrm>
+            <a:prstGeom prst="ellipse">
+              <a:avLst/>
+            </a:prstGeom>
+            <a:solidFill>
+              <a:srgbClr val="15D3B2"/>
+            </a:solidFill>
+            <a:ln>
+              <a:solidFill>
+                <a:schemeClr val="tx1"/>
+              </a:solidFill>
+            </a:ln>
+          </p:spPr>
+          <p:style>
+            <a:lnRef idx="2">
+              <a:schemeClr val="accent1">
+                <a:shade val="50000"/>
+              </a:schemeClr>
+            </a:lnRef>
+            <a:fillRef idx="1">
+              <a:schemeClr val="accent1"/>
+            </a:fillRef>
+            <a:effectRef idx="0">
+              <a:schemeClr val="accent1"/>
+            </a:effectRef>
+            <a:fontRef idx="minor">
+              <a:schemeClr val="lt1"/>
+            </a:fontRef>
+          </p:style>
+          <p:txBody>
+            <a:bodyPr lIns="0" tIns="0" rIns="0" bIns="0" rtlCol="0" anchor="ctr"/>
+            <a:lstStyle/>
+            <a:p>
+              <a:pPr algn="ctr"/>
+              <a:r>
+                <a:rPr lang="en-US" altLang="ko-KR" sz="1200" dirty="0" smtClean="0">
+                  <a:solidFill>
+                    <a:schemeClr val="bg1"/>
+                  </a:solidFill>
+                  <a:latin typeface="삼성긴고딕OTF Medium" panose="020B0600000101010101" pitchFamily="34" charset="-127"/>
+                  <a:ea typeface="삼성긴고딕OTF Medium" panose="020B0600000101010101" pitchFamily="34" charset="-127"/>
+                </a:rPr>
+                <a:t>3 – 4</a:t>
+              </a:r>
+              <a:br>
+                <a:rPr lang="en-US" altLang="ko-KR" sz="1200" dirty="0" smtClean="0">
+                  <a:solidFill>
+                    <a:schemeClr val="bg1"/>
+                  </a:solidFill>
+                  <a:latin typeface="삼성긴고딕OTF Medium" panose="020B0600000101010101" pitchFamily="34" charset="-127"/>
+                  <a:ea typeface="삼성긴고딕OTF Medium" panose="020B0600000101010101" pitchFamily="34" charset="-127"/>
+                </a:rPr>
+              </a:br>
+              <a:r>
+                <a:rPr lang="en-US" altLang="ko-KR" sz="1200" dirty="0" smtClean="0">
+                  <a:solidFill>
+                    <a:srgbClr val="FF0000"/>
+                  </a:solidFill>
+                  <a:latin typeface="삼성긴고딕OTF Medium" panose="020B0600000101010101" pitchFamily="34" charset="-127"/>
+                  <a:ea typeface="삼성긴고딕OTF Medium" panose="020B0600000101010101" pitchFamily="34" charset="-127"/>
+                </a:rPr>
+                <a:t>12</a:t>
+              </a:r>
+              <a:endParaRPr lang="ko-KR" altLang="en-US" sz="1200" dirty="0">
+                <a:solidFill>
+                  <a:srgbClr val="FF0000"/>
+                </a:solidFill>
+                <a:latin typeface="삼성긴고딕OTF Medium" panose="020B0600000101010101" pitchFamily="34" charset="-127"/>
+                <a:ea typeface="삼성긴고딕OTF Medium" panose="020B0600000101010101" pitchFamily="34" charset="-127"/>
+              </a:endParaRPr>
+            </a:p>
+          </p:txBody>
+        </p:sp>
+        <p:sp>
+          <p:nvSpPr>
+            <p:cNvPr id="50" name="타원 49"/>
+            <p:cNvSpPr/>
+            <p:nvPr/>
+          </p:nvSpPr>
+          <p:spPr>
+            <a:xfrm>
+              <a:off x="1897673" y="4810214"/>
+              <a:ext cx="540000" cy="540000"/>
+            </a:xfrm>
+            <a:prstGeom prst="ellipse">
+              <a:avLst/>
+            </a:prstGeom>
+            <a:noFill/>
+            <a:ln>
+              <a:solidFill>
+                <a:schemeClr val="tx1"/>
+              </a:solidFill>
+            </a:ln>
+          </p:spPr>
+          <p:style>
+            <a:lnRef idx="2">
+              <a:schemeClr val="accent1">
+                <a:shade val="50000"/>
+              </a:schemeClr>
+            </a:lnRef>
+            <a:fillRef idx="1">
+              <a:schemeClr val="accent1"/>
+            </a:fillRef>
+            <a:effectRef idx="0">
+              <a:schemeClr val="accent1"/>
+            </a:effectRef>
+            <a:fontRef idx="minor">
+              <a:schemeClr val="lt1"/>
+            </a:fontRef>
+          </p:style>
+          <p:txBody>
+            <a:bodyPr lIns="0" tIns="0" rIns="0" bIns="0" rtlCol="0" anchor="ctr"/>
+            <a:lstStyle/>
+            <a:p>
+              <a:pPr algn="ctr"/>
+              <a:r>
+                <a:rPr lang="en-US" altLang="ko-KR" sz="1200" dirty="0" smtClean="0">
+                  <a:solidFill>
+                    <a:schemeClr val="tx1"/>
+                  </a:solidFill>
+                  <a:latin typeface="삼성긴고딕OTF Medium" panose="020B0600000101010101" pitchFamily="34" charset="-127"/>
+                  <a:ea typeface="삼성긴고딕OTF Medium" panose="020B0600000101010101" pitchFamily="34" charset="-127"/>
+                </a:rPr>
+                <a:t>0 – 1</a:t>
+              </a:r>
+              <a:br>
+                <a:rPr lang="en-US" altLang="ko-KR" sz="1200" dirty="0" smtClean="0">
+                  <a:solidFill>
+                    <a:schemeClr val="tx1"/>
+                  </a:solidFill>
+                  <a:latin typeface="삼성긴고딕OTF Medium" panose="020B0600000101010101" pitchFamily="34" charset="-127"/>
+                  <a:ea typeface="삼성긴고딕OTF Medium" panose="020B0600000101010101" pitchFamily="34" charset="-127"/>
+                </a:rPr>
+              </a:br>
+              <a:r>
+                <a:rPr lang="en-US" altLang="ko-KR" sz="1200" dirty="0" smtClean="0">
+                  <a:solidFill>
+                    <a:schemeClr val="accent5"/>
+                  </a:solidFill>
+                  <a:latin typeface="삼성긴고딕OTF Medium" panose="020B0600000101010101" pitchFamily="34" charset="-127"/>
+                  <a:ea typeface="삼성긴고딕OTF Medium" panose="020B0600000101010101" pitchFamily="34" charset="-127"/>
+                </a:rPr>
+                <a:t>9</a:t>
+              </a:r>
+              <a:endParaRPr lang="ko-KR" altLang="en-US" sz="1200" dirty="0">
+                <a:solidFill>
+                  <a:schemeClr val="accent5"/>
+                </a:solidFill>
+                <a:latin typeface="삼성긴고딕OTF Medium" panose="020B0600000101010101" pitchFamily="34" charset="-127"/>
+                <a:ea typeface="삼성긴고딕OTF Medium" panose="020B0600000101010101" pitchFamily="34" charset="-127"/>
+              </a:endParaRPr>
+            </a:p>
+          </p:txBody>
+        </p:sp>
+        <p:sp>
+          <p:nvSpPr>
+            <p:cNvPr id="51" name="타원 50"/>
+            <p:cNvSpPr/>
+            <p:nvPr/>
+          </p:nvSpPr>
+          <p:spPr>
+            <a:xfrm>
+              <a:off x="3034517" y="4810214"/>
+              <a:ext cx="540000" cy="540000"/>
+            </a:xfrm>
+            <a:prstGeom prst="ellipse">
+              <a:avLst/>
+            </a:prstGeom>
+            <a:noFill/>
+            <a:ln>
+              <a:solidFill>
+                <a:schemeClr val="tx1"/>
+              </a:solidFill>
+            </a:ln>
+          </p:spPr>
+          <p:style>
+            <a:lnRef idx="2">
+              <a:schemeClr val="accent1">
+                <a:shade val="50000"/>
+              </a:schemeClr>
+            </a:lnRef>
+            <a:fillRef idx="1">
+              <a:schemeClr val="accent1"/>
+            </a:fillRef>
+            <a:effectRef idx="0">
+              <a:schemeClr val="accent1"/>
+            </a:effectRef>
+            <a:fontRef idx="minor">
+              <a:schemeClr val="lt1"/>
+            </a:fontRef>
+          </p:style>
+          <p:txBody>
+            <a:bodyPr lIns="0" tIns="0" rIns="0" bIns="0" rtlCol="0" anchor="ctr"/>
+            <a:lstStyle/>
+            <a:p>
+              <a:pPr algn="ctr"/>
+              <a:r>
+                <a:rPr lang="en-US" altLang="ko-KR" sz="1200" dirty="0">
+                  <a:solidFill>
+                    <a:schemeClr val="tx1"/>
+                  </a:solidFill>
+                  <a:latin typeface="삼성긴고딕OTF Medium" panose="020B0600000101010101" pitchFamily="34" charset="-127"/>
+                  <a:ea typeface="삼성긴고딕OTF Medium" panose="020B0600000101010101" pitchFamily="34" charset="-127"/>
+                </a:rPr>
+                <a:t>2</a:t>
+              </a:r>
+              <a:r>
+                <a:rPr lang="en-US" altLang="ko-KR" sz="1200" dirty="0" smtClean="0">
+                  <a:solidFill>
+                    <a:schemeClr val="tx1"/>
+                  </a:solidFill>
+                  <a:latin typeface="삼성긴고딕OTF Medium" panose="020B0600000101010101" pitchFamily="34" charset="-127"/>
+                  <a:ea typeface="삼성긴고딕OTF Medium" panose="020B0600000101010101" pitchFamily="34" charset="-127"/>
+                </a:rPr>
+                <a:t> – 2</a:t>
+              </a:r>
+              <a:br>
+                <a:rPr lang="en-US" altLang="ko-KR" sz="1200" dirty="0" smtClean="0">
+                  <a:solidFill>
+                    <a:schemeClr val="tx1"/>
+                  </a:solidFill>
+                  <a:latin typeface="삼성긴고딕OTF Medium" panose="020B0600000101010101" pitchFamily="34" charset="-127"/>
+                  <a:ea typeface="삼성긴고딕OTF Medium" panose="020B0600000101010101" pitchFamily="34" charset="-127"/>
+                </a:rPr>
+              </a:br>
+              <a:r>
+                <a:rPr lang="en-US" altLang="ko-KR" sz="1200" dirty="0" smtClean="0">
+                  <a:solidFill>
+                    <a:schemeClr val="accent5"/>
+                  </a:solidFill>
+                  <a:latin typeface="삼성긴고딕OTF Medium" panose="020B0600000101010101" pitchFamily="34" charset="-127"/>
+                  <a:ea typeface="삼성긴고딕OTF Medium" panose="020B0600000101010101" pitchFamily="34" charset="-127"/>
+                </a:rPr>
+                <a:t>2</a:t>
+              </a:r>
+              <a:endParaRPr lang="ko-KR" altLang="en-US" sz="1200" dirty="0">
+                <a:solidFill>
+                  <a:schemeClr val="accent5"/>
+                </a:solidFill>
+                <a:latin typeface="삼성긴고딕OTF Medium" panose="020B0600000101010101" pitchFamily="34" charset="-127"/>
+                <a:ea typeface="삼성긴고딕OTF Medium" panose="020B0600000101010101" pitchFamily="34" charset="-127"/>
+              </a:endParaRPr>
+            </a:p>
+          </p:txBody>
+        </p:sp>
+        <p:sp>
+          <p:nvSpPr>
+            <p:cNvPr id="52" name="타원 51"/>
+            <p:cNvSpPr/>
+            <p:nvPr/>
+          </p:nvSpPr>
+          <p:spPr>
+            <a:xfrm>
+              <a:off x="1357673" y="5733758"/>
+              <a:ext cx="540000" cy="540000"/>
+            </a:xfrm>
+            <a:prstGeom prst="ellipse">
+              <a:avLst/>
+            </a:prstGeom>
+            <a:noFill/>
+            <a:ln>
+              <a:solidFill>
+                <a:schemeClr val="tx1"/>
+              </a:solidFill>
+            </a:ln>
+          </p:spPr>
+          <p:style>
+            <a:lnRef idx="2">
+              <a:schemeClr val="accent1">
+                <a:shade val="50000"/>
+              </a:schemeClr>
+            </a:lnRef>
+            <a:fillRef idx="1">
+              <a:schemeClr val="accent1"/>
+            </a:fillRef>
+            <a:effectRef idx="0">
+              <a:schemeClr val="accent1"/>
+            </a:effectRef>
+            <a:fontRef idx="minor">
+              <a:schemeClr val="lt1"/>
+            </a:fontRef>
+          </p:style>
+          <p:txBody>
+            <a:bodyPr lIns="0" tIns="0" rIns="0" bIns="0" rtlCol="0" anchor="ctr"/>
+            <a:lstStyle/>
+            <a:p>
+              <a:pPr algn="ctr"/>
+              <a:r>
+                <a:rPr lang="en-US" altLang="ko-KR" sz="1200" dirty="0" smtClean="0">
+                  <a:solidFill>
+                    <a:schemeClr val="tx1"/>
+                  </a:solidFill>
+                  <a:latin typeface="삼성긴고딕OTF Medium" panose="020B0600000101010101" pitchFamily="34" charset="-127"/>
+                  <a:ea typeface="삼성긴고딕OTF Medium" panose="020B0600000101010101" pitchFamily="34" charset="-127"/>
+                </a:rPr>
+                <a:t>0 – 0</a:t>
+              </a:r>
+              <a:br>
+                <a:rPr lang="en-US" altLang="ko-KR" sz="1200" dirty="0" smtClean="0">
+                  <a:solidFill>
+                    <a:schemeClr val="tx1"/>
+                  </a:solidFill>
+                  <a:latin typeface="삼성긴고딕OTF Medium" panose="020B0600000101010101" pitchFamily="34" charset="-127"/>
+                  <a:ea typeface="삼성긴고딕OTF Medium" panose="020B0600000101010101" pitchFamily="34" charset="-127"/>
+                </a:rPr>
+              </a:br>
+              <a:r>
+                <a:rPr lang="en-US" altLang="ko-KR" sz="1200" dirty="0" smtClean="0">
+                  <a:solidFill>
+                    <a:schemeClr val="accent5"/>
+                  </a:solidFill>
+                  <a:latin typeface="삼성긴고딕OTF Medium" panose="020B0600000101010101" pitchFamily="34" charset="-127"/>
+                  <a:ea typeface="삼성긴고딕OTF Medium" panose="020B0600000101010101" pitchFamily="34" charset="-127"/>
+                </a:rPr>
+                <a:t>3</a:t>
+              </a:r>
+              <a:endParaRPr lang="ko-KR" altLang="en-US" sz="1200" dirty="0">
+                <a:solidFill>
+                  <a:schemeClr val="accent5"/>
+                </a:solidFill>
+                <a:latin typeface="삼성긴고딕OTF Medium" panose="020B0600000101010101" pitchFamily="34" charset="-127"/>
+                <a:ea typeface="삼성긴고딕OTF Medium" panose="020B0600000101010101" pitchFamily="34" charset="-127"/>
+              </a:endParaRPr>
+            </a:p>
+          </p:txBody>
+        </p:sp>
+        <p:sp>
+          <p:nvSpPr>
+            <p:cNvPr id="53" name="타원 52"/>
+            <p:cNvSpPr/>
+            <p:nvPr/>
+          </p:nvSpPr>
+          <p:spPr>
+            <a:xfrm>
+              <a:off x="2437673" y="5733758"/>
+              <a:ext cx="540000" cy="540000"/>
+            </a:xfrm>
+            <a:prstGeom prst="ellipse">
+              <a:avLst/>
+            </a:prstGeom>
+            <a:noFill/>
+            <a:ln>
+              <a:solidFill>
+                <a:schemeClr val="tx1"/>
+              </a:solidFill>
+            </a:ln>
+          </p:spPr>
+          <p:style>
+            <a:lnRef idx="2">
+              <a:schemeClr val="accent1">
+                <a:shade val="50000"/>
+              </a:schemeClr>
+            </a:lnRef>
+            <a:fillRef idx="1">
+              <a:schemeClr val="accent1"/>
+            </a:fillRef>
+            <a:effectRef idx="0">
+              <a:schemeClr val="accent1"/>
+            </a:effectRef>
+            <a:fontRef idx="minor">
+              <a:schemeClr val="lt1"/>
+            </a:fontRef>
+          </p:style>
+          <p:txBody>
+            <a:bodyPr lIns="0" tIns="0" rIns="0" bIns="0" rtlCol="0" anchor="ctr"/>
+            <a:lstStyle/>
+            <a:p>
+              <a:pPr algn="ctr"/>
+              <a:r>
+                <a:rPr lang="en-US" altLang="ko-KR" sz="1200" dirty="0">
+                  <a:solidFill>
+                    <a:schemeClr val="tx1"/>
+                  </a:solidFill>
+                  <a:latin typeface="삼성긴고딕OTF Medium" panose="020B0600000101010101" pitchFamily="34" charset="-127"/>
+                  <a:ea typeface="삼성긴고딕OTF Medium" panose="020B0600000101010101" pitchFamily="34" charset="-127"/>
+                </a:rPr>
+                <a:t>1</a:t>
+              </a:r>
+              <a:r>
+                <a:rPr lang="en-US" altLang="ko-KR" sz="1200" dirty="0" smtClean="0">
+                  <a:solidFill>
+                    <a:schemeClr val="tx1"/>
+                  </a:solidFill>
+                  <a:latin typeface="삼성긴고딕OTF Medium" panose="020B0600000101010101" pitchFamily="34" charset="-127"/>
+                  <a:ea typeface="삼성긴고딕OTF Medium" panose="020B0600000101010101" pitchFamily="34" charset="-127"/>
+                </a:rPr>
+                <a:t> – 1</a:t>
+              </a:r>
+              <a:br>
+                <a:rPr lang="en-US" altLang="ko-KR" sz="1200" dirty="0" smtClean="0">
+                  <a:solidFill>
+                    <a:schemeClr val="tx1"/>
+                  </a:solidFill>
+                  <a:latin typeface="삼성긴고딕OTF Medium" panose="020B0600000101010101" pitchFamily="34" charset="-127"/>
+                  <a:ea typeface="삼성긴고딕OTF Medium" panose="020B0600000101010101" pitchFamily="34" charset="-127"/>
+                </a:rPr>
+              </a:br>
+              <a:r>
+                <a:rPr lang="en-US" altLang="ko-KR" sz="1200" dirty="0" smtClean="0">
+                  <a:solidFill>
+                    <a:schemeClr val="accent5"/>
+                  </a:solidFill>
+                  <a:latin typeface="삼성긴고딕OTF Medium" panose="020B0600000101010101" pitchFamily="34" charset="-127"/>
+                  <a:ea typeface="삼성긴고딕OTF Medium" panose="020B0600000101010101" pitchFamily="34" charset="-127"/>
+                </a:rPr>
+                <a:t>6</a:t>
+              </a:r>
+              <a:endParaRPr lang="ko-KR" altLang="en-US" sz="1200" dirty="0">
+                <a:solidFill>
+                  <a:schemeClr val="accent5"/>
+                </a:solidFill>
+                <a:latin typeface="삼성긴고딕OTF Medium" panose="020B0600000101010101" pitchFamily="34" charset="-127"/>
+                <a:ea typeface="삼성긴고딕OTF Medium" panose="020B0600000101010101" pitchFamily="34" charset="-127"/>
+              </a:endParaRPr>
+            </a:p>
+          </p:txBody>
+        </p:sp>
+        <p:sp>
+          <p:nvSpPr>
+            <p:cNvPr id="54" name="타원 53"/>
+            <p:cNvSpPr/>
+            <p:nvPr/>
+          </p:nvSpPr>
+          <p:spPr>
+            <a:xfrm>
+              <a:off x="3975617" y="4811188"/>
+              <a:ext cx="540000" cy="540000"/>
+            </a:xfrm>
+            <a:prstGeom prst="ellipse">
+              <a:avLst/>
+            </a:prstGeom>
+            <a:solidFill>
+              <a:srgbClr val="1D75E5"/>
+            </a:solidFill>
+            <a:ln>
+              <a:solidFill>
+                <a:schemeClr val="tx1"/>
+              </a:solidFill>
+            </a:ln>
+          </p:spPr>
+          <p:style>
+            <a:lnRef idx="2">
+              <a:schemeClr val="accent1">
+                <a:shade val="50000"/>
+              </a:schemeClr>
+            </a:lnRef>
+            <a:fillRef idx="1">
+              <a:schemeClr val="accent1"/>
+            </a:fillRef>
+            <a:effectRef idx="0">
+              <a:schemeClr val="accent1"/>
+            </a:effectRef>
+            <a:fontRef idx="minor">
+              <a:schemeClr val="lt1"/>
+            </a:fontRef>
+          </p:style>
+          <p:txBody>
+            <a:bodyPr lIns="0" tIns="0" rIns="0" bIns="0" rtlCol="0" anchor="ctr"/>
+            <a:lstStyle/>
+            <a:p>
+              <a:pPr algn="ctr"/>
+              <a:r>
+                <a:rPr lang="en-US" altLang="ko-KR" sz="1200" dirty="0" smtClean="0">
+                  <a:solidFill>
+                    <a:schemeClr val="bg1"/>
+                  </a:solidFill>
+                  <a:latin typeface="삼성긴고딕OTF Medium" panose="020B0600000101010101" pitchFamily="34" charset="-127"/>
+                  <a:ea typeface="삼성긴고딕OTF Medium" panose="020B0600000101010101" pitchFamily="34" charset="-127"/>
+                </a:rPr>
+                <a:t>3 – 3</a:t>
+              </a:r>
+              <a:br>
+                <a:rPr lang="en-US" altLang="ko-KR" sz="1200" dirty="0" smtClean="0">
+                  <a:solidFill>
+                    <a:schemeClr val="bg1"/>
+                  </a:solidFill>
+                  <a:latin typeface="삼성긴고딕OTF Medium" panose="020B0600000101010101" pitchFamily="34" charset="-127"/>
+                  <a:ea typeface="삼성긴고딕OTF Medium" panose="020B0600000101010101" pitchFamily="34" charset="-127"/>
+                </a:rPr>
+              </a:br>
+              <a:r>
+                <a:rPr lang="en-US" altLang="ko-KR" sz="1200" dirty="0" smtClean="0">
+                  <a:solidFill>
+                    <a:srgbClr val="FF0000"/>
+                  </a:solidFill>
+                  <a:latin typeface="삼성긴고딕OTF Medium" panose="020B0600000101010101" pitchFamily="34" charset="-127"/>
+                  <a:ea typeface="삼성긴고딕OTF Medium" panose="020B0600000101010101" pitchFamily="34" charset="-127"/>
+                </a:rPr>
+                <a:t>5</a:t>
+              </a:r>
+              <a:endParaRPr lang="ko-KR" altLang="en-US" sz="1200" dirty="0">
+                <a:solidFill>
+                  <a:srgbClr val="FF0000"/>
+                </a:solidFill>
+                <a:latin typeface="삼성긴고딕OTF Medium" panose="020B0600000101010101" pitchFamily="34" charset="-127"/>
+                <a:ea typeface="삼성긴고딕OTF Medium" panose="020B0600000101010101" pitchFamily="34" charset="-127"/>
+              </a:endParaRPr>
+            </a:p>
+          </p:txBody>
+        </p:sp>
+        <p:sp>
+          <p:nvSpPr>
+            <p:cNvPr id="55" name="타원 54"/>
+            <p:cNvSpPr/>
+            <p:nvPr/>
+          </p:nvSpPr>
+          <p:spPr>
+            <a:xfrm>
+              <a:off x="4976536" y="4811188"/>
+              <a:ext cx="540000" cy="540000"/>
+            </a:xfrm>
+            <a:prstGeom prst="ellipse">
+              <a:avLst/>
+            </a:prstGeom>
+            <a:solidFill>
+              <a:srgbClr val="1D75E5"/>
+            </a:solidFill>
+            <a:ln>
+              <a:solidFill>
+                <a:schemeClr val="tx1"/>
+              </a:solidFill>
+            </a:ln>
+          </p:spPr>
+          <p:style>
+            <a:lnRef idx="2">
+              <a:schemeClr val="accent1">
+                <a:shade val="50000"/>
+              </a:schemeClr>
+            </a:lnRef>
+            <a:fillRef idx="1">
+              <a:schemeClr val="accent1"/>
+            </a:fillRef>
+            <a:effectRef idx="0">
+              <a:schemeClr val="accent1"/>
+            </a:effectRef>
+            <a:fontRef idx="minor">
+              <a:schemeClr val="lt1"/>
+            </a:fontRef>
+          </p:style>
+          <p:txBody>
+            <a:bodyPr lIns="0" tIns="0" rIns="0" bIns="0" rtlCol="0" anchor="ctr"/>
+            <a:lstStyle/>
+            <a:p>
+              <a:pPr algn="ctr"/>
+              <a:r>
+                <a:rPr lang="en-US" altLang="ko-KR" sz="1200" dirty="0" smtClean="0">
+                  <a:solidFill>
+                    <a:schemeClr val="bg1"/>
+                  </a:solidFill>
+                  <a:latin typeface="삼성긴고딕OTF Medium" panose="020B0600000101010101" pitchFamily="34" charset="-127"/>
+                  <a:ea typeface="삼성긴고딕OTF Medium" panose="020B0600000101010101" pitchFamily="34" charset="-127"/>
+                </a:rPr>
+                <a:t>4 – 4</a:t>
+              </a:r>
+              <a:br>
+                <a:rPr lang="en-US" altLang="ko-KR" sz="1200" dirty="0" smtClean="0">
+                  <a:solidFill>
+                    <a:schemeClr val="bg1"/>
+                  </a:solidFill>
+                  <a:latin typeface="삼성긴고딕OTF Medium" panose="020B0600000101010101" pitchFamily="34" charset="-127"/>
+                  <a:ea typeface="삼성긴고딕OTF Medium" panose="020B0600000101010101" pitchFamily="34" charset="-127"/>
+                </a:rPr>
+              </a:br>
+              <a:r>
+                <a:rPr lang="en-US" altLang="ko-KR" sz="1200" dirty="0" smtClean="0">
+                  <a:solidFill>
+                    <a:srgbClr val="FF0000"/>
+                  </a:solidFill>
+                  <a:latin typeface="삼성긴고딕OTF Medium" panose="020B0600000101010101" pitchFamily="34" charset="-127"/>
+                  <a:ea typeface="삼성긴고딕OTF Medium" panose="020B0600000101010101" pitchFamily="34" charset="-127"/>
+                </a:rPr>
+                <a:t>3</a:t>
+              </a:r>
+              <a:endParaRPr lang="ko-KR" altLang="en-US" sz="1200" dirty="0">
+                <a:solidFill>
+                  <a:srgbClr val="FF0000"/>
+                </a:solidFill>
+                <a:latin typeface="삼성긴고딕OTF Medium" panose="020B0600000101010101" pitchFamily="34" charset="-127"/>
+                <a:ea typeface="삼성긴고딕OTF Medium" panose="020B0600000101010101" pitchFamily="34" charset="-127"/>
+              </a:endParaRPr>
+            </a:p>
+          </p:txBody>
+        </p:sp>
+        <p:sp>
+          <p:nvSpPr>
+            <p:cNvPr id="56" name="타원 55"/>
+            <p:cNvSpPr/>
+            <p:nvPr/>
+          </p:nvSpPr>
+          <p:spPr>
+            <a:xfrm>
+              <a:off x="6638066" y="3891494"/>
+              <a:ext cx="540000" cy="540000"/>
+            </a:xfrm>
+            <a:prstGeom prst="ellipse">
+              <a:avLst/>
+            </a:prstGeom>
+            <a:solidFill>
+              <a:srgbClr val="15D3B2"/>
+            </a:solidFill>
+            <a:ln>
+              <a:solidFill>
+                <a:schemeClr val="tx1"/>
+              </a:solidFill>
+            </a:ln>
+          </p:spPr>
+          <p:style>
+            <a:lnRef idx="2">
+              <a:schemeClr val="accent1">
+                <a:shade val="50000"/>
+              </a:schemeClr>
+            </a:lnRef>
+            <a:fillRef idx="1">
+              <a:schemeClr val="accent1"/>
+            </a:fillRef>
+            <a:effectRef idx="0">
+              <a:schemeClr val="accent1"/>
+            </a:effectRef>
+            <a:fontRef idx="minor">
+              <a:schemeClr val="lt1"/>
+            </a:fontRef>
+          </p:style>
+          <p:txBody>
+            <a:bodyPr lIns="0" tIns="0" rIns="0" bIns="0" rtlCol="0" anchor="ctr"/>
+            <a:lstStyle/>
+            <a:p>
+              <a:pPr algn="ctr"/>
+              <a:r>
+                <a:rPr lang="en-US" altLang="ko-KR" sz="1200" dirty="0" smtClean="0">
+                  <a:solidFill>
+                    <a:schemeClr val="bg1"/>
+                  </a:solidFill>
+                  <a:latin typeface="삼성긴고딕OTF Medium" panose="020B0600000101010101" pitchFamily="34" charset="-127"/>
+                  <a:ea typeface="삼성긴고딕OTF Medium" panose="020B0600000101010101" pitchFamily="34" charset="-127"/>
+                </a:rPr>
+                <a:t>5 – 7</a:t>
+              </a:r>
+              <a:br>
+                <a:rPr lang="en-US" altLang="ko-KR" sz="1200" dirty="0" smtClean="0">
+                  <a:solidFill>
+                    <a:schemeClr val="bg1"/>
+                  </a:solidFill>
+                  <a:latin typeface="삼성긴고딕OTF Medium" panose="020B0600000101010101" pitchFamily="34" charset="-127"/>
+                  <a:ea typeface="삼성긴고딕OTF Medium" panose="020B0600000101010101" pitchFamily="34" charset="-127"/>
+                </a:rPr>
+              </a:br>
+              <a:r>
+                <a:rPr lang="en-US" altLang="ko-KR" sz="1200" dirty="0" smtClean="0">
+                  <a:solidFill>
+                    <a:srgbClr val="FF0000"/>
+                  </a:solidFill>
+                  <a:latin typeface="삼성긴고딕OTF Medium" panose="020B0600000101010101" pitchFamily="34" charset="-127"/>
+                  <a:ea typeface="삼성긴고딕OTF Medium" panose="020B0600000101010101" pitchFamily="34" charset="-127"/>
+                </a:rPr>
+                <a:t>24</a:t>
+              </a:r>
+              <a:endParaRPr lang="ko-KR" altLang="en-US" sz="1200" dirty="0">
+                <a:solidFill>
+                  <a:srgbClr val="FF0000"/>
+                </a:solidFill>
+                <a:latin typeface="삼성긴고딕OTF Medium" panose="020B0600000101010101" pitchFamily="34" charset="-127"/>
+                <a:ea typeface="삼성긴고딕OTF Medium" panose="020B0600000101010101" pitchFamily="34" charset="-127"/>
+              </a:endParaRPr>
+            </a:p>
+          </p:txBody>
+        </p:sp>
+        <p:sp>
+          <p:nvSpPr>
+            <p:cNvPr id="57" name="타원 56"/>
+            <p:cNvSpPr/>
+            <p:nvPr/>
+          </p:nvSpPr>
+          <p:spPr>
+            <a:xfrm>
+              <a:off x="6099183" y="4811188"/>
+              <a:ext cx="540000" cy="540000"/>
+            </a:xfrm>
+            <a:prstGeom prst="ellipse">
+              <a:avLst/>
+            </a:prstGeom>
+            <a:solidFill>
+              <a:srgbClr val="1D75E5"/>
+            </a:solidFill>
+            <a:ln>
+              <a:solidFill>
+                <a:schemeClr val="tx1"/>
+              </a:solidFill>
+            </a:ln>
+          </p:spPr>
+          <p:style>
+            <a:lnRef idx="2">
+              <a:schemeClr val="accent1">
+                <a:shade val="50000"/>
+              </a:schemeClr>
+            </a:lnRef>
+            <a:fillRef idx="1">
+              <a:schemeClr val="accent1"/>
+            </a:fillRef>
+            <a:effectRef idx="0">
+              <a:schemeClr val="accent1"/>
+            </a:effectRef>
+            <a:fontRef idx="minor">
+              <a:schemeClr val="lt1"/>
+            </a:fontRef>
+          </p:style>
+          <p:txBody>
+            <a:bodyPr lIns="0" tIns="0" rIns="0" bIns="0" rtlCol="0" anchor="ctr"/>
+            <a:lstStyle/>
+            <a:p>
+              <a:pPr algn="ctr"/>
+              <a:r>
+                <a:rPr lang="en-US" altLang="ko-KR" sz="1200" dirty="0" smtClean="0">
+                  <a:solidFill>
+                    <a:schemeClr val="bg1"/>
+                  </a:solidFill>
+                  <a:latin typeface="삼성긴고딕OTF Medium" panose="020B0600000101010101" pitchFamily="34" charset="-127"/>
+                  <a:ea typeface="삼성긴고딕OTF Medium" panose="020B0600000101010101" pitchFamily="34" charset="-127"/>
+                </a:rPr>
+                <a:t>5 – 6</a:t>
+              </a:r>
+              <a:br>
+                <a:rPr lang="en-US" altLang="ko-KR" sz="1200" dirty="0" smtClean="0">
+                  <a:solidFill>
+                    <a:schemeClr val="bg1"/>
+                  </a:solidFill>
+                  <a:latin typeface="삼성긴고딕OTF Medium" panose="020B0600000101010101" pitchFamily="34" charset="-127"/>
+                  <a:ea typeface="삼성긴고딕OTF Medium" panose="020B0600000101010101" pitchFamily="34" charset="-127"/>
+                </a:rPr>
+              </a:br>
+              <a:r>
+                <a:rPr lang="en-US" altLang="ko-KR" sz="1200" dirty="0" smtClean="0">
+                  <a:solidFill>
+                    <a:srgbClr val="FF0000"/>
+                  </a:solidFill>
+                  <a:latin typeface="삼성긴고딕OTF Medium" panose="020B0600000101010101" pitchFamily="34" charset="-127"/>
+                  <a:ea typeface="삼성긴고딕OTF Medium" panose="020B0600000101010101" pitchFamily="34" charset="-127"/>
+                </a:rPr>
+                <a:t>9</a:t>
+              </a:r>
+              <a:endParaRPr lang="ko-KR" altLang="en-US" sz="1200" dirty="0">
+                <a:solidFill>
+                  <a:srgbClr val="FF0000"/>
+                </a:solidFill>
+                <a:latin typeface="삼성긴고딕OTF Medium" panose="020B0600000101010101" pitchFamily="34" charset="-127"/>
+                <a:ea typeface="삼성긴고딕OTF Medium" panose="020B0600000101010101" pitchFamily="34" charset="-127"/>
+              </a:endParaRPr>
+            </a:p>
+          </p:txBody>
+        </p:sp>
+        <p:sp>
+          <p:nvSpPr>
+            <p:cNvPr id="58" name="타원 57"/>
+            <p:cNvSpPr/>
+            <p:nvPr/>
+          </p:nvSpPr>
+          <p:spPr>
+            <a:xfrm>
+              <a:off x="7178066" y="4811188"/>
+              <a:ext cx="540000" cy="540000"/>
+            </a:xfrm>
+            <a:prstGeom prst="ellipse">
+              <a:avLst/>
+            </a:prstGeom>
+            <a:solidFill>
+              <a:srgbClr val="1D75E5"/>
+            </a:solidFill>
+            <a:ln>
+              <a:solidFill>
+                <a:schemeClr val="tx1"/>
+              </a:solidFill>
+            </a:ln>
+          </p:spPr>
+          <p:style>
+            <a:lnRef idx="2">
+              <a:schemeClr val="accent1">
+                <a:shade val="50000"/>
+              </a:schemeClr>
+            </a:lnRef>
+            <a:fillRef idx="1">
+              <a:schemeClr val="accent1"/>
+            </a:fillRef>
+            <a:effectRef idx="0">
+              <a:schemeClr val="accent1"/>
+            </a:effectRef>
+            <a:fontRef idx="minor">
+              <a:schemeClr val="lt1"/>
+            </a:fontRef>
+          </p:style>
+          <p:txBody>
+            <a:bodyPr lIns="0" tIns="0" rIns="0" bIns="0" rtlCol="0" anchor="ctr"/>
+            <a:lstStyle/>
+            <a:p>
+              <a:pPr algn="ctr"/>
+              <a:r>
+                <a:rPr lang="en-US" altLang="ko-KR" sz="1200" dirty="0" smtClean="0">
+                  <a:solidFill>
+                    <a:schemeClr val="bg1"/>
+                  </a:solidFill>
+                  <a:latin typeface="삼성긴고딕OTF Medium" panose="020B0600000101010101" pitchFamily="34" charset="-127"/>
+                  <a:ea typeface="삼성긴고딕OTF Medium" panose="020B0600000101010101" pitchFamily="34" charset="-127"/>
+                </a:rPr>
+                <a:t>7 – 7</a:t>
+              </a:r>
+              <a:br>
+                <a:rPr lang="en-US" altLang="ko-KR" sz="1200" dirty="0" smtClean="0">
+                  <a:solidFill>
+                    <a:schemeClr val="bg1"/>
+                  </a:solidFill>
+                  <a:latin typeface="삼성긴고딕OTF Medium" panose="020B0600000101010101" pitchFamily="34" charset="-127"/>
+                  <a:ea typeface="삼성긴고딕OTF Medium" panose="020B0600000101010101" pitchFamily="34" charset="-127"/>
+                </a:rPr>
+              </a:br>
+              <a:r>
+                <a:rPr lang="en-US" altLang="ko-KR" sz="1200" dirty="0" smtClean="0">
+                  <a:solidFill>
+                    <a:srgbClr val="FF0000"/>
+                  </a:solidFill>
+                  <a:latin typeface="삼성긴고딕OTF Medium" panose="020B0600000101010101" pitchFamily="34" charset="-127"/>
+                  <a:ea typeface="삼성긴고딕OTF Medium" panose="020B0600000101010101" pitchFamily="34" charset="-127"/>
+                </a:rPr>
+                <a:t>9</a:t>
+              </a:r>
+              <a:endParaRPr lang="ko-KR" altLang="en-US" sz="1200" dirty="0">
+                <a:solidFill>
+                  <a:srgbClr val="FF0000"/>
+                </a:solidFill>
+                <a:latin typeface="삼성긴고딕OTF Medium" panose="020B0600000101010101" pitchFamily="34" charset="-127"/>
+                <a:ea typeface="삼성긴고딕OTF Medium" panose="020B0600000101010101" pitchFamily="34" charset="-127"/>
+              </a:endParaRPr>
+            </a:p>
+          </p:txBody>
+        </p:sp>
+        <p:sp>
+          <p:nvSpPr>
+            <p:cNvPr id="59" name="타원 58"/>
+            <p:cNvSpPr/>
+            <p:nvPr/>
+          </p:nvSpPr>
+          <p:spPr>
+            <a:xfrm>
+              <a:off x="5560299" y="5733758"/>
+              <a:ext cx="540000" cy="540000"/>
+            </a:xfrm>
+            <a:prstGeom prst="ellipse">
+              <a:avLst/>
+            </a:prstGeom>
+            <a:solidFill>
+              <a:srgbClr val="1D75E5"/>
+            </a:solidFill>
+            <a:ln>
+              <a:solidFill>
+                <a:schemeClr val="tx1"/>
+              </a:solidFill>
+            </a:ln>
+          </p:spPr>
+          <p:style>
+            <a:lnRef idx="2">
+              <a:schemeClr val="accent1">
+                <a:shade val="50000"/>
+              </a:schemeClr>
+            </a:lnRef>
+            <a:fillRef idx="1">
+              <a:schemeClr val="accent1"/>
+            </a:fillRef>
+            <a:effectRef idx="0">
+              <a:schemeClr val="accent1"/>
+            </a:effectRef>
+            <a:fontRef idx="minor">
+              <a:schemeClr val="lt1"/>
+            </a:fontRef>
+          </p:style>
+          <p:txBody>
+            <a:bodyPr lIns="0" tIns="0" rIns="0" bIns="0" rtlCol="0" anchor="ctr"/>
+            <a:lstStyle/>
+            <a:p>
+              <a:pPr algn="ctr"/>
+              <a:r>
+                <a:rPr lang="en-US" altLang="ko-KR" sz="1200" dirty="0" smtClean="0">
+                  <a:solidFill>
+                    <a:schemeClr val="bg1"/>
+                  </a:solidFill>
+                  <a:latin typeface="삼성긴고딕OTF Medium" panose="020B0600000101010101" pitchFamily="34" charset="-127"/>
+                  <a:ea typeface="삼성긴고딕OTF Medium" panose="020B0600000101010101" pitchFamily="34" charset="-127"/>
+                </a:rPr>
+                <a:t>5 – 5</a:t>
+              </a:r>
+              <a:br>
+                <a:rPr lang="en-US" altLang="ko-KR" sz="1200" dirty="0" smtClean="0">
+                  <a:solidFill>
+                    <a:schemeClr val="bg1"/>
+                  </a:solidFill>
+                  <a:latin typeface="삼성긴고딕OTF Medium" panose="020B0600000101010101" pitchFamily="34" charset="-127"/>
+                  <a:ea typeface="삼성긴고딕OTF Medium" panose="020B0600000101010101" pitchFamily="34" charset="-127"/>
+                </a:rPr>
+              </a:br>
+              <a:r>
+                <a:rPr lang="en-US" altLang="ko-KR" sz="1200" dirty="0" smtClean="0">
+                  <a:solidFill>
+                    <a:srgbClr val="FF0000"/>
+                  </a:solidFill>
+                  <a:latin typeface="삼성긴고딕OTF Medium" panose="020B0600000101010101" pitchFamily="34" charset="-127"/>
+                  <a:ea typeface="삼성긴고딕OTF Medium" panose="020B0600000101010101" pitchFamily="34" charset="-127"/>
+                </a:rPr>
+                <a:t>1</a:t>
+              </a:r>
+              <a:endParaRPr lang="ko-KR" altLang="en-US" sz="1200" dirty="0">
+                <a:solidFill>
+                  <a:srgbClr val="FF0000"/>
+                </a:solidFill>
+                <a:latin typeface="삼성긴고딕OTF Medium" panose="020B0600000101010101" pitchFamily="34" charset="-127"/>
+                <a:ea typeface="삼성긴고딕OTF Medium" panose="020B0600000101010101" pitchFamily="34" charset="-127"/>
+              </a:endParaRPr>
+            </a:p>
+          </p:txBody>
+        </p:sp>
+        <p:sp>
+          <p:nvSpPr>
+            <p:cNvPr id="60" name="타원 59"/>
+            <p:cNvSpPr/>
+            <p:nvPr/>
+          </p:nvSpPr>
+          <p:spPr>
+            <a:xfrm>
+              <a:off x="6638066" y="5733758"/>
+              <a:ext cx="540000" cy="540000"/>
+            </a:xfrm>
+            <a:prstGeom prst="ellipse">
+              <a:avLst/>
+            </a:prstGeom>
+            <a:solidFill>
+              <a:srgbClr val="1D75E5"/>
+            </a:solidFill>
+            <a:ln>
+              <a:solidFill>
+                <a:schemeClr val="tx1"/>
+              </a:solidFill>
+            </a:ln>
+          </p:spPr>
+          <p:style>
+            <a:lnRef idx="2">
+              <a:schemeClr val="accent1">
+                <a:shade val="50000"/>
+              </a:schemeClr>
+            </a:lnRef>
+            <a:fillRef idx="1">
+              <a:schemeClr val="accent1"/>
+            </a:fillRef>
+            <a:effectRef idx="0">
+              <a:schemeClr val="accent1"/>
+            </a:effectRef>
+            <a:fontRef idx="minor">
+              <a:schemeClr val="lt1"/>
+            </a:fontRef>
+          </p:style>
+          <p:txBody>
+            <a:bodyPr lIns="0" tIns="0" rIns="0" bIns="0" rtlCol="0" anchor="ctr"/>
+            <a:lstStyle/>
+            <a:p>
+              <a:pPr algn="ctr"/>
+              <a:r>
+                <a:rPr lang="en-US" altLang="ko-KR" sz="1200" dirty="0" smtClean="0">
+                  <a:solidFill>
+                    <a:schemeClr val="bg1"/>
+                  </a:solidFill>
+                  <a:latin typeface="삼성긴고딕OTF Medium" panose="020B0600000101010101" pitchFamily="34" charset="-127"/>
+                  <a:ea typeface="삼성긴고딕OTF Medium" panose="020B0600000101010101" pitchFamily="34" charset="-127"/>
+                </a:rPr>
+                <a:t>6 – 6</a:t>
+              </a:r>
+              <a:br>
+                <a:rPr lang="en-US" altLang="ko-KR" sz="1200" dirty="0" smtClean="0">
+                  <a:solidFill>
+                    <a:schemeClr val="bg1"/>
+                  </a:solidFill>
+                  <a:latin typeface="삼성긴고딕OTF Medium" panose="020B0600000101010101" pitchFamily="34" charset="-127"/>
+                  <a:ea typeface="삼성긴고딕OTF Medium" panose="020B0600000101010101" pitchFamily="34" charset="-127"/>
+                </a:rPr>
+              </a:br>
+              <a:r>
+                <a:rPr lang="en-US" altLang="ko-KR" sz="1200" dirty="0" smtClean="0">
+                  <a:solidFill>
+                    <a:srgbClr val="FF0000"/>
+                  </a:solidFill>
+                  <a:latin typeface="삼성긴고딕OTF Medium" panose="020B0600000101010101" pitchFamily="34" charset="-127"/>
+                  <a:ea typeface="삼성긴고딕OTF Medium" panose="020B0600000101010101" pitchFamily="34" charset="-127"/>
+                </a:rPr>
+                <a:t>8</a:t>
+              </a:r>
+              <a:endParaRPr lang="ko-KR" altLang="en-US" sz="1200" dirty="0">
+                <a:solidFill>
+                  <a:srgbClr val="FF0000"/>
+                </a:solidFill>
+                <a:latin typeface="삼성긴고딕OTF Medium" panose="020B0600000101010101" pitchFamily="34" charset="-127"/>
+                <a:ea typeface="삼성긴고딕OTF Medium" panose="020B0600000101010101" pitchFamily="34" charset="-127"/>
+              </a:endParaRPr>
+            </a:p>
+          </p:txBody>
+        </p:sp>
+        <p:cxnSp>
+          <p:nvCxnSpPr>
+            <p:cNvPr id="61" name="직선 연결선 60"/>
+            <p:cNvCxnSpPr>
+              <a:stCxn id="50" idx="3"/>
+              <a:endCxn id="52" idx="0"/>
+            </p:cNvCxnSpPr>
+            <p:nvPr/>
+          </p:nvCxnSpPr>
+          <p:spPr>
+            <a:xfrm flipH="1">
+              <a:off x="1627673" y="5271133"/>
+              <a:ext cx="349081" cy="462625"/>
+            </a:xfrm>
+            <a:prstGeom prst="line">
+              <a:avLst/>
+            </a:prstGeom>
+            <a:ln>
+              <a:solidFill>
+                <a:schemeClr val="tx1"/>
+              </a:solidFill>
+            </a:ln>
+          </p:spPr>
+          <p:style>
+            <a:lnRef idx="1">
+              <a:schemeClr val="accent1"/>
+            </a:lnRef>
+            <a:fillRef idx="0">
+              <a:schemeClr val="accent1"/>
+            </a:fillRef>
+            <a:effectRef idx="0">
+              <a:schemeClr val="accent1"/>
+            </a:effectRef>
+            <a:fontRef idx="minor">
+              <a:schemeClr val="tx1"/>
+            </a:fontRef>
+          </p:style>
+        </p:cxnSp>
+        <p:cxnSp>
+          <p:nvCxnSpPr>
+            <p:cNvPr id="62" name="직선 연결선 61"/>
+            <p:cNvCxnSpPr>
+              <a:stCxn id="50" idx="5"/>
+              <a:endCxn id="53" idx="0"/>
+            </p:cNvCxnSpPr>
+            <p:nvPr/>
+          </p:nvCxnSpPr>
+          <p:spPr>
+            <a:xfrm>
+              <a:off x="2358592" y="5271133"/>
+              <a:ext cx="349081" cy="462625"/>
+            </a:xfrm>
+            <a:prstGeom prst="line">
+              <a:avLst/>
+            </a:prstGeom>
+            <a:ln>
+              <a:solidFill>
+                <a:schemeClr val="tx1"/>
+              </a:solidFill>
+            </a:ln>
+          </p:spPr>
+          <p:style>
+            <a:lnRef idx="1">
+              <a:schemeClr val="accent1"/>
+            </a:lnRef>
+            <a:fillRef idx="0">
+              <a:schemeClr val="accent1"/>
+            </a:fillRef>
+            <a:effectRef idx="0">
+              <a:schemeClr val="accent1"/>
+            </a:effectRef>
+            <a:fontRef idx="minor">
+              <a:schemeClr val="tx1"/>
+            </a:fontRef>
+          </p:style>
+        </p:cxnSp>
+        <p:cxnSp>
+          <p:nvCxnSpPr>
+            <p:cNvPr id="63" name="직선 연결선 62"/>
+            <p:cNvCxnSpPr>
+              <a:stCxn id="48" idx="3"/>
+              <a:endCxn id="50" idx="0"/>
+            </p:cNvCxnSpPr>
+            <p:nvPr/>
+          </p:nvCxnSpPr>
+          <p:spPr>
+            <a:xfrm flipH="1">
+              <a:off x="2167673" y="4352413"/>
+              <a:ext cx="390489" cy="457801"/>
+            </a:xfrm>
+            <a:prstGeom prst="line">
+              <a:avLst/>
+            </a:prstGeom>
+            <a:ln>
+              <a:solidFill>
+                <a:schemeClr val="tx1"/>
+              </a:solidFill>
+            </a:ln>
+          </p:spPr>
+          <p:style>
+            <a:lnRef idx="1">
+              <a:schemeClr val="accent1"/>
+            </a:lnRef>
+            <a:fillRef idx="0">
+              <a:schemeClr val="accent1"/>
+            </a:fillRef>
+            <a:effectRef idx="0">
+              <a:schemeClr val="accent1"/>
+            </a:effectRef>
+            <a:fontRef idx="minor">
+              <a:schemeClr val="tx1"/>
+            </a:fontRef>
+          </p:style>
+        </p:cxnSp>
+        <p:cxnSp>
+          <p:nvCxnSpPr>
+            <p:cNvPr id="64" name="직선 연결선 63"/>
+            <p:cNvCxnSpPr>
+              <a:stCxn id="48" idx="5"/>
+              <a:endCxn id="51" idx="0"/>
+            </p:cNvCxnSpPr>
+            <p:nvPr/>
+          </p:nvCxnSpPr>
+          <p:spPr>
+            <a:xfrm>
+              <a:off x="2940000" y="4352413"/>
+              <a:ext cx="364517" cy="457801"/>
+            </a:xfrm>
+            <a:prstGeom prst="line">
+              <a:avLst/>
+            </a:prstGeom>
+            <a:ln>
+              <a:solidFill>
+                <a:schemeClr val="tx1"/>
+              </a:solidFill>
+            </a:ln>
+          </p:spPr>
+          <p:style>
+            <a:lnRef idx="1">
+              <a:schemeClr val="accent1"/>
+            </a:lnRef>
+            <a:fillRef idx="0">
+              <a:schemeClr val="accent1"/>
+            </a:fillRef>
+            <a:effectRef idx="0">
+              <a:schemeClr val="accent1"/>
+            </a:effectRef>
+            <a:fontRef idx="minor">
+              <a:schemeClr val="tx1"/>
+            </a:fontRef>
+          </p:style>
+        </p:cxnSp>
+        <p:cxnSp>
+          <p:nvCxnSpPr>
+            <p:cNvPr id="65" name="직선 연결선 64"/>
+            <p:cNvCxnSpPr>
+              <a:stCxn id="49" idx="3"/>
+              <a:endCxn id="54" idx="0"/>
+            </p:cNvCxnSpPr>
+            <p:nvPr/>
+          </p:nvCxnSpPr>
+          <p:spPr>
+            <a:xfrm flipH="1">
+              <a:off x="4245617" y="4353387"/>
+              <a:ext cx="309541" cy="457801"/>
+            </a:xfrm>
+            <a:prstGeom prst="line">
+              <a:avLst/>
+            </a:prstGeom>
+            <a:ln>
+              <a:solidFill>
+                <a:schemeClr val="tx1"/>
+              </a:solidFill>
+            </a:ln>
+          </p:spPr>
+          <p:style>
+            <a:lnRef idx="1">
+              <a:schemeClr val="accent1"/>
+            </a:lnRef>
+            <a:fillRef idx="0">
+              <a:schemeClr val="accent1"/>
+            </a:fillRef>
+            <a:effectRef idx="0">
+              <a:schemeClr val="accent1"/>
+            </a:effectRef>
+            <a:fontRef idx="minor">
+              <a:schemeClr val="tx1"/>
+            </a:fontRef>
+          </p:style>
+        </p:cxnSp>
+        <p:cxnSp>
+          <p:nvCxnSpPr>
+            <p:cNvPr id="66" name="직선 연결선 65"/>
+            <p:cNvCxnSpPr>
+              <a:stCxn id="49" idx="5"/>
+              <a:endCxn id="55" idx="0"/>
+            </p:cNvCxnSpPr>
+            <p:nvPr/>
+          </p:nvCxnSpPr>
+          <p:spPr>
+            <a:xfrm>
+              <a:off x="4936996" y="4353387"/>
+              <a:ext cx="309540" cy="457801"/>
+            </a:xfrm>
+            <a:prstGeom prst="line">
+              <a:avLst/>
+            </a:prstGeom>
+            <a:ln>
+              <a:solidFill>
+                <a:schemeClr val="tx1"/>
+              </a:solidFill>
+            </a:ln>
+          </p:spPr>
+          <p:style>
+            <a:lnRef idx="1">
+              <a:schemeClr val="accent1"/>
+            </a:lnRef>
+            <a:fillRef idx="0">
+              <a:schemeClr val="accent1"/>
+            </a:fillRef>
+            <a:effectRef idx="0">
+              <a:schemeClr val="accent1"/>
+            </a:effectRef>
+            <a:fontRef idx="minor">
+              <a:schemeClr val="tx1"/>
+            </a:fontRef>
+          </p:style>
+        </p:cxnSp>
+        <p:cxnSp>
+          <p:nvCxnSpPr>
+            <p:cNvPr id="67" name="직선 연결선 66"/>
+            <p:cNvCxnSpPr>
+              <a:stCxn id="46" idx="3"/>
+              <a:endCxn id="48" idx="0"/>
+            </p:cNvCxnSpPr>
+            <p:nvPr/>
+          </p:nvCxnSpPr>
+          <p:spPr>
+            <a:xfrm flipH="1">
+              <a:off x="2749081" y="3136261"/>
+              <a:ext cx="807579" cy="755233"/>
+            </a:xfrm>
+            <a:prstGeom prst="line">
+              <a:avLst/>
+            </a:prstGeom>
+            <a:ln>
+              <a:solidFill>
+                <a:schemeClr val="tx1"/>
+              </a:solidFill>
+            </a:ln>
+          </p:spPr>
+          <p:style>
+            <a:lnRef idx="1">
+              <a:schemeClr val="accent1"/>
+            </a:lnRef>
+            <a:fillRef idx="0">
+              <a:schemeClr val="accent1"/>
+            </a:fillRef>
+            <a:effectRef idx="0">
+              <a:schemeClr val="accent1"/>
+            </a:effectRef>
+            <a:fontRef idx="minor">
+              <a:schemeClr val="tx1"/>
+            </a:fontRef>
+          </p:style>
+        </p:cxnSp>
+        <p:cxnSp>
+          <p:nvCxnSpPr>
+            <p:cNvPr id="68" name="직선 연결선 67"/>
+            <p:cNvCxnSpPr>
+              <a:stCxn id="46" idx="5"/>
+              <a:endCxn id="49" idx="0"/>
+            </p:cNvCxnSpPr>
+            <p:nvPr/>
+          </p:nvCxnSpPr>
+          <p:spPr>
+            <a:xfrm>
+              <a:off x="3938498" y="3136261"/>
+              <a:ext cx="807579" cy="756207"/>
+            </a:xfrm>
+            <a:prstGeom prst="line">
+              <a:avLst/>
+            </a:prstGeom>
+            <a:ln>
+              <a:solidFill>
+                <a:schemeClr val="tx1"/>
+              </a:solidFill>
+            </a:ln>
+          </p:spPr>
+          <p:style>
+            <a:lnRef idx="1">
+              <a:schemeClr val="accent1"/>
+            </a:lnRef>
+            <a:fillRef idx="0">
+              <a:schemeClr val="accent1"/>
+            </a:fillRef>
+            <a:effectRef idx="0">
+              <a:schemeClr val="accent1"/>
+            </a:effectRef>
+            <a:fontRef idx="minor">
+              <a:schemeClr val="tx1"/>
+            </a:fontRef>
+          </p:style>
+        </p:cxnSp>
+        <p:cxnSp>
+          <p:nvCxnSpPr>
+            <p:cNvPr id="69" name="직선 연결선 68"/>
+            <p:cNvCxnSpPr>
+              <a:stCxn id="56" idx="3"/>
+              <a:endCxn id="57" idx="0"/>
+            </p:cNvCxnSpPr>
+            <p:nvPr/>
+          </p:nvCxnSpPr>
+          <p:spPr>
+            <a:xfrm flipH="1">
+              <a:off x="6369183" y="4352413"/>
+              <a:ext cx="347964" cy="458775"/>
+            </a:xfrm>
+            <a:prstGeom prst="line">
+              <a:avLst/>
+            </a:prstGeom>
+            <a:ln>
+              <a:solidFill>
+                <a:schemeClr val="tx1"/>
+              </a:solidFill>
+            </a:ln>
+          </p:spPr>
+          <p:style>
+            <a:lnRef idx="1">
+              <a:schemeClr val="accent1"/>
+            </a:lnRef>
+            <a:fillRef idx="0">
+              <a:schemeClr val="accent1"/>
+            </a:fillRef>
+            <a:effectRef idx="0">
+              <a:schemeClr val="accent1"/>
+            </a:effectRef>
+            <a:fontRef idx="minor">
+              <a:schemeClr val="tx1"/>
+            </a:fontRef>
+          </p:style>
+        </p:cxnSp>
+        <p:cxnSp>
+          <p:nvCxnSpPr>
+            <p:cNvPr id="70" name="직선 연결선 69"/>
+            <p:cNvCxnSpPr>
+              <a:stCxn id="56" idx="5"/>
+              <a:endCxn id="58" idx="0"/>
+            </p:cNvCxnSpPr>
+            <p:nvPr/>
+          </p:nvCxnSpPr>
+          <p:spPr>
+            <a:xfrm>
+              <a:off x="7098985" y="4352413"/>
+              <a:ext cx="349081" cy="458775"/>
+            </a:xfrm>
+            <a:prstGeom prst="line">
+              <a:avLst/>
+            </a:prstGeom>
+            <a:ln>
+              <a:solidFill>
+                <a:schemeClr val="tx1"/>
+              </a:solidFill>
+            </a:ln>
+          </p:spPr>
+          <p:style>
+            <a:lnRef idx="1">
+              <a:schemeClr val="accent1"/>
+            </a:lnRef>
+            <a:fillRef idx="0">
+              <a:schemeClr val="accent1"/>
+            </a:fillRef>
+            <a:effectRef idx="0">
+              <a:schemeClr val="accent1"/>
+            </a:effectRef>
+            <a:fontRef idx="minor">
+              <a:schemeClr val="tx1"/>
+            </a:fontRef>
+          </p:style>
+        </p:cxnSp>
+        <p:sp>
+          <p:nvSpPr>
+            <p:cNvPr id="71" name="타원 70"/>
+            <p:cNvSpPr/>
+            <p:nvPr/>
+          </p:nvSpPr>
+          <p:spPr>
+            <a:xfrm>
+              <a:off x="8794419" y="3891494"/>
+              <a:ext cx="540000" cy="540000"/>
+            </a:xfrm>
+            <a:prstGeom prst="ellipse">
+              <a:avLst/>
+            </a:prstGeom>
+            <a:solidFill>
+              <a:srgbClr val="E62154"/>
+            </a:solidFill>
+            <a:ln>
+              <a:solidFill>
+                <a:schemeClr val="tx1"/>
+              </a:solidFill>
+            </a:ln>
+          </p:spPr>
+          <p:style>
+            <a:lnRef idx="2">
+              <a:schemeClr val="accent1">
+                <a:shade val="50000"/>
+              </a:schemeClr>
+            </a:lnRef>
+            <a:fillRef idx="1">
+              <a:schemeClr val="accent1"/>
+            </a:fillRef>
+            <a:effectRef idx="0">
+              <a:schemeClr val="accent1"/>
+            </a:effectRef>
+            <a:fontRef idx="minor">
+              <a:schemeClr val="lt1"/>
+            </a:fontRef>
+          </p:style>
+          <p:txBody>
+            <a:bodyPr lIns="0" tIns="0" rIns="0" bIns="0" rtlCol="0" anchor="ctr"/>
+            <a:lstStyle/>
+            <a:p>
+              <a:pPr algn="ctr"/>
+              <a:r>
+                <a:rPr lang="en-US" altLang="ko-KR" sz="1200" dirty="0" smtClean="0">
+                  <a:solidFill>
+                    <a:schemeClr val="bg1"/>
+                  </a:solidFill>
+                  <a:latin typeface="삼성긴고딕OTF Medium" panose="020B0600000101010101" pitchFamily="34" charset="-127"/>
+                  <a:ea typeface="삼성긴고딕OTF Medium" panose="020B0600000101010101" pitchFamily="34" charset="-127"/>
+                </a:rPr>
+                <a:t>8 – 9</a:t>
+              </a:r>
+              <a:br>
+                <a:rPr lang="en-US" altLang="ko-KR" sz="1200" dirty="0" smtClean="0">
+                  <a:solidFill>
+                    <a:schemeClr val="bg1"/>
+                  </a:solidFill>
+                  <a:latin typeface="삼성긴고딕OTF Medium" panose="020B0600000101010101" pitchFamily="34" charset="-127"/>
+                  <a:ea typeface="삼성긴고딕OTF Medium" panose="020B0600000101010101" pitchFamily="34" charset="-127"/>
+                </a:rPr>
+              </a:br>
+              <a:r>
+                <a:rPr lang="en-US" altLang="ko-KR" sz="1200" dirty="0" smtClean="0">
+                  <a:solidFill>
+                    <a:schemeClr val="bg2">
+                      <a:lumMod val="90000"/>
+                    </a:schemeClr>
+                  </a:solidFill>
+                  <a:latin typeface="삼성긴고딕OTF Medium" panose="020B0600000101010101" pitchFamily="34" charset="-127"/>
+                  <a:ea typeface="삼성긴고딕OTF Medium" panose="020B0600000101010101" pitchFamily="34" charset="-127"/>
+                </a:rPr>
+                <a:t>10</a:t>
+              </a:r>
+              <a:endParaRPr lang="ko-KR" altLang="en-US" sz="1200" dirty="0">
+                <a:solidFill>
+                  <a:schemeClr val="bg2">
+                    <a:lumMod val="90000"/>
+                  </a:schemeClr>
+                </a:solidFill>
+                <a:latin typeface="삼성긴고딕OTF Medium" panose="020B0600000101010101" pitchFamily="34" charset="-127"/>
+                <a:ea typeface="삼성긴고딕OTF Medium" panose="020B0600000101010101" pitchFamily="34" charset="-127"/>
+              </a:endParaRPr>
+            </a:p>
+          </p:txBody>
+        </p:sp>
+        <p:sp>
+          <p:nvSpPr>
+            <p:cNvPr id="72" name="타원 71"/>
+            <p:cNvSpPr/>
+            <p:nvPr/>
+          </p:nvSpPr>
+          <p:spPr>
+            <a:xfrm>
+              <a:off x="8254419" y="4811188"/>
+              <a:ext cx="540000" cy="540000"/>
+            </a:xfrm>
+            <a:prstGeom prst="ellipse">
+              <a:avLst/>
+            </a:prstGeom>
+            <a:noFill/>
+            <a:ln>
+              <a:solidFill>
+                <a:schemeClr val="tx1"/>
+              </a:solidFill>
+            </a:ln>
+          </p:spPr>
+          <p:style>
+            <a:lnRef idx="2">
+              <a:schemeClr val="accent1">
+                <a:shade val="50000"/>
+              </a:schemeClr>
+            </a:lnRef>
+            <a:fillRef idx="1">
+              <a:schemeClr val="accent1"/>
+            </a:fillRef>
+            <a:effectRef idx="0">
+              <a:schemeClr val="accent1"/>
+            </a:effectRef>
+            <a:fontRef idx="minor">
+              <a:schemeClr val="lt1"/>
+            </a:fontRef>
+          </p:style>
+          <p:txBody>
+            <a:bodyPr lIns="0" tIns="0" rIns="0" bIns="0" rtlCol="0" anchor="ctr"/>
+            <a:lstStyle/>
+            <a:p>
+              <a:pPr algn="ctr"/>
+              <a:r>
+                <a:rPr lang="en-US" altLang="ko-KR" sz="1200" dirty="0" smtClean="0">
+                  <a:solidFill>
+                    <a:schemeClr val="tx1"/>
+                  </a:solidFill>
+                  <a:latin typeface="삼성긴고딕OTF Medium" panose="020B0600000101010101" pitchFamily="34" charset="-127"/>
+                  <a:ea typeface="삼성긴고딕OTF Medium" panose="020B0600000101010101" pitchFamily="34" charset="-127"/>
+                </a:rPr>
+                <a:t>8 – 8</a:t>
+              </a:r>
+              <a:br>
+                <a:rPr lang="en-US" altLang="ko-KR" sz="1200" dirty="0" smtClean="0">
+                  <a:solidFill>
+                    <a:schemeClr val="tx1"/>
+                  </a:solidFill>
+                  <a:latin typeface="삼성긴고딕OTF Medium" panose="020B0600000101010101" pitchFamily="34" charset="-127"/>
+                  <a:ea typeface="삼성긴고딕OTF Medium" panose="020B0600000101010101" pitchFamily="34" charset="-127"/>
+                </a:rPr>
+              </a:br>
+              <a:r>
+                <a:rPr lang="en-US" altLang="ko-KR" sz="1200" dirty="0" smtClean="0">
+                  <a:solidFill>
+                    <a:schemeClr val="accent5"/>
+                  </a:solidFill>
+                  <a:latin typeface="삼성긴고딕OTF Medium" panose="020B0600000101010101" pitchFamily="34" charset="-127"/>
+                  <a:ea typeface="삼성긴고딕OTF Medium" panose="020B0600000101010101" pitchFamily="34" charset="-127"/>
+                </a:rPr>
+                <a:t>7</a:t>
+              </a:r>
+              <a:endParaRPr lang="ko-KR" altLang="en-US" sz="1200" dirty="0">
+                <a:solidFill>
+                  <a:schemeClr val="accent5"/>
+                </a:solidFill>
+                <a:latin typeface="삼성긴고딕OTF Medium" panose="020B0600000101010101" pitchFamily="34" charset="-127"/>
+                <a:ea typeface="삼성긴고딕OTF Medium" panose="020B0600000101010101" pitchFamily="34" charset="-127"/>
+              </a:endParaRPr>
+            </a:p>
+          </p:txBody>
+        </p:sp>
+        <p:sp>
+          <p:nvSpPr>
+            <p:cNvPr id="73" name="타원 72"/>
+            <p:cNvSpPr/>
+            <p:nvPr/>
+          </p:nvSpPr>
+          <p:spPr>
+            <a:xfrm>
+              <a:off x="9330772" y="4811188"/>
+              <a:ext cx="540000" cy="540000"/>
+            </a:xfrm>
+            <a:prstGeom prst="ellipse">
+              <a:avLst/>
+            </a:prstGeom>
+            <a:noFill/>
+            <a:ln>
+              <a:solidFill>
+                <a:schemeClr val="tx1"/>
+              </a:solidFill>
+            </a:ln>
+          </p:spPr>
+          <p:style>
+            <a:lnRef idx="2">
+              <a:schemeClr val="accent1">
+                <a:shade val="50000"/>
+              </a:schemeClr>
+            </a:lnRef>
+            <a:fillRef idx="1">
+              <a:schemeClr val="accent1"/>
+            </a:fillRef>
+            <a:effectRef idx="0">
+              <a:schemeClr val="accent1"/>
+            </a:effectRef>
+            <a:fontRef idx="minor">
+              <a:schemeClr val="lt1"/>
+            </a:fontRef>
+          </p:style>
+          <p:txBody>
+            <a:bodyPr lIns="0" tIns="0" rIns="0" bIns="0" rtlCol="0" anchor="ctr"/>
+            <a:lstStyle/>
+            <a:p>
+              <a:pPr algn="ctr"/>
+              <a:r>
+                <a:rPr lang="en-US" altLang="ko-KR" sz="1200" dirty="0" smtClean="0">
+                  <a:solidFill>
+                    <a:schemeClr val="tx1"/>
+                  </a:solidFill>
+                  <a:latin typeface="삼성긴고딕OTF Medium" panose="020B0600000101010101" pitchFamily="34" charset="-127"/>
+                  <a:ea typeface="삼성긴고딕OTF Medium" panose="020B0600000101010101" pitchFamily="34" charset="-127"/>
+                </a:rPr>
+                <a:t>9 – 9</a:t>
+              </a:r>
+              <a:br>
+                <a:rPr lang="en-US" altLang="ko-KR" sz="1200" dirty="0" smtClean="0">
+                  <a:solidFill>
+                    <a:schemeClr val="tx1"/>
+                  </a:solidFill>
+                  <a:latin typeface="삼성긴고딕OTF Medium" panose="020B0600000101010101" pitchFamily="34" charset="-127"/>
+                  <a:ea typeface="삼성긴고딕OTF Medium" panose="020B0600000101010101" pitchFamily="34" charset="-127"/>
+                </a:rPr>
+              </a:br>
+              <a:r>
+                <a:rPr lang="en-US" altLang="ko-KR" sz="1200" dirty="0">
+                  <a:solidFill>
+                    <a:schemeClr val="accent5"/>
+                  </a:solidFill>
+                  <a:latin typeface="삼성긴고딕OTF Medium" panose="020B0600000101010101" pitchFamily="34" charset="-127"/>
+                  <a:ea typeface="삼성긴고딕OTF Medium" panose="020B0600000101010101" pitchFamily="34" charset="-127"/>
+                </a:rPr>
+                <a:t>3</a:t>
+              </a:r>
+              <a:endParaRPr lang="ko-KR" altLang="en-US" sz="1200" dirty="0">
+                <a:solidFill>
+                  <a:schemeClr val="accent5"/>
+                </a:solidFill>
+                <a:latin typeface="삼성긴고딕OTF Medium" panose="020B0600000101010101" pitchFamily="34" charset="-127"/>
+                <a:ea typeface="삼성긴고딕OTF Medium" panose="020B0600000101010101" pitchFamily="34" charset="-127"/>
+              </a:endParaRPr>
+            </a:p>
+          </p:txBody>
+        </p:sp>
+        <p:cxnSp>
+          <p:nvCxnSpPr>
+            <p:cNvPr id="74" name="직선 연결선 73"/>
+            <p:cNvCxnSpPr>
+              <a:stCxn id="71" idx="3"/>
+              <a:endCxn id="72" idx="0"/>
+            </p:cNvCxnSpPr>
+            <p:nvPr/>
+          </p:nvCxnSpPr>
+          <p:spPr>
+            <a:xfrm flipH="1">
+              <a:off x="8524419" y="4352413"/>
+              <a:ext cx="349081" cy="458775"/>
+            </a:xfrm>
+            <a:prstGeom prst="line">
+              <a:avLst/>
+            </a:prstGeom>
+            <a:ln>
+              <a:solidFill>
+                <a:schemeClr val="tx1"/>
+              </a:solidFill>
+            </a:ln>
+          </p:spPr>
+          <p:style>
+            <a:lnRef idx="1">
+              <a:schemeClr val="accent1"/>
+            </a:lnRef>
+            <a:fillRef idx="0">
+              <a:schemeClr val="accent1"/>
+            </a:fillRef>
+            <a:effectRef idx="0">
+              <a:schemeClr val="accent1"/>
+            </a:effectRef>
+            <a:fontRef idx="minor">
+              <a:schemeClr val="tx1"/>
+            </a:fontRef>
+          </p:style>
+        </p:cxnSp>
+        <p:cxnSp>
+          <p:nvCxnSpPr>
+            <p:cNvPr id="75" name="직선 연결선 74"/>
+            <p:cNvCxnSpPr>
+              <a:stCxn id="71" idx="5"/>
+              <a:endCxn id="73" idx="0"/>
+            </p:cNvCxnSpPr>
+            <p:nvPr/>
+          </p:nvCxnSpPr>
+          <p:spPr>
+            <a:xfrm>
+              <a:off x="9255338" y="4352413"/>
+              <a:ext cx="345434" cy="458775"/>
+            </a:xfrm>
+            <a:prstGeom prst="line">
+              <a:avLst/>
+            </a:prstGeom>
+            <a:ln>
+              <a:solidFill>
+                <a:schemeClr val="tx1"/>
+              </a:solidFill>
+            </a:ln>
+          </p:spPr>
+          <p:style>
+            <a:lnRef idx="1">
+              <a:schemeClr val="accent1"/>
+            </a:lnRef>
+            <a:fillRef idx="0">
+              <a:schemeClr val="accent1"/>
+            </a:fillRef>
+            <a:effectRef idx="0">
+              <a:schemeClr val="accent1"/>
+            </a:effectRef>
+            <a:fontRef idx="minor">
+              <a:schemeClr val="tx1"/>
+            </a:fontRef>
+          </p:style>
+        </p:cxnSp>
+        <p:cxnSp>
+          <p:nvCxnSpPr>
+            <p:cNvPr id="76" name="직선 연결선 75"/>
+            <p:cNvCxnSpPr>
+              <a:stCxn id="57" idx="3"/>
+              <a:endCxn id="59" idx="0"/>
+            </p:cNvCxnSpPr>
+            <p:nvPr/>
+          </p:nvCxnSpPr>
+          <p:spPr>
+            <a:xfrm flipH="1">
+              <a:off x="5830299" y="5272107"/>
+              <a:ext cx="347965" cy="461651"/>
+            </a:xfrm>
+            <a:prstGeom prst="line">
+              <a:avLst/>
+            </a:prstGeom>
+            <a:ln>
+              <a:solidFill>
+                <a:schemeClr val="tx1"/>
+              </a:solidFill>
+            </a:ln>
+          </p:spPr>
+          <p:style>
+            <a:lnRef idx="1">
+              <a:schemeClr val="accent1"/>
+            </a:lnRef>
+            <a:fillRef idx="0">
+              <a:schemeClr val="accent1"/>
+            </a:fillRef>
+            <a:effectRef idx="0">
+              <a:schemeClr val="accent1"/>
+            </a:effectRef>
+            <a:fontRef idx="minor">
+              <a:schemeClr val="tx1"/>
+            </a:fontRef>
+          </p:style>
+        </p:cxnSp>
+        <p:cxnSp>
+          <p:nvCxnSpPr>
+            <p:cNvPr id="77" name="직선 연결선 76"/>
+            <p:cNvCxnSpPr>
+              <a:stCxn id="57" idx="5"/>
+              <a:endCxn id="60" idx="0"/>
+            </p:cNvCxnSpPr>
+            <p:nvPr/>
+          </p:nvCxnSpPr>
+          <p:spPr>
+            <a:xfrm>
+              <a:off x="6560102" y="5272107"/>
+              <a:ext cx="347964" cy="461651"/>
+            </a:xfrm>
+            <a:prstGeom prst="line">
+              <a:avLst/>
+            </a:prstGeom>
+            <a:ln>
+              <a:solidFill>
+                <a:schemeClr val="tx1"/>
+              </a:solidFill>
+            </a:ln>
+          </p:spPr>
+          <p:style>
+            <a:lnRef idx="1">
+              <a:schemeClr val="accent1"/>
+            </a:lnRef>
+            <a:fillRef idx="0">
+              <a:schemeClr val="accent1"/>
+            </a:fillRef>
+            <a:effectRef idx="0">
+              <a:schemeClr val="accent1"/>
+            </a:effectRef>
+            <a:fontRef idx="minor">
+              <a:schemeClr val="tx1"/>
+            </a:fontRef>
+          </p:style>
+        </p:cxnSp>
+        <p:cxnSp>
+          <p:nvCxnSpPr>
+            <p:cNvPr id="78" name="직선 연결선 77"/>
+            <p:cNvCxnSpPr>
+              <a:stCxn id="47" idx="3"/>
+              <a:endCxn id="56" idx="0"/>
+            </p:cNvCxnSpPr>
+            <p:nvPr/>
+          </p:nvCxnSpPr>
+          <p:spPr>
+            <a:xfrm flipH="1">
+              <a:off x="6908066" y="3136261"/>
+              <a:ext cx="887257" cy="755233"/>
+            </a:xfrm>
+            <a:prstGeom prst="line">
+              <a:avLst/>
+            </a:prstGeom>
+            <a:ln>
+              <a:solidFill>
+                <a:schemeClr val="tx1"/>
+              </a:solidFill>
+            </a:ln>
+          </p:spPr>
+          <p:style>
+            <a:lnRef idx="1">
+              <a:schemeClr val="accent1"/>
+            </a:lnRef>
+            <a:fillRef idx="0">
+              <a:schemeClr val="accent1"/>
+            </a:fillRef>
+            <a:effectRef idx="0">
+              <a:schemeClr val="accent1"/>
+            </a:effectRef>
+            <a:fontRef idx="minor">
+              <a:schemeClr val="tx1"/>
+            </a:fontRef>
+          </p:style>
+        </p:cxnSp>
+        <p:cxnSp>
+          <p:nvCxnSpPr>
+            <p:cNvPr id="79" name="직선 연결선 78"/>
+            <p:cNvCxnSpPr>
+              <a:stCxn id="47" idx="5"/>
+              <a:endCxn id="71" idx="0"/>
+            </p:cNvCxnSpPr>
+            <p:nvPr/>
+          </p:nvCxnSpPr>
+          <p:spPr>
+            <a:xfrm>
+              <a:off x="8177161" y="3136261"/>
+              <a:ext cx="887258" cy="755233"/>
+            </a:xfrm>
+            <a:prstGeom prst="line">
+              <a:avLst/>
+            </a:prstGeom>
+            <a:ln>
+              <a:solidFill>
+                <a:schemeClr val="tx1"/>
+              </a:solidFill>
+            </a:ln>
+          </p:spPr>
+          <p:style>
+            <a:lnRef idx="1">
+              <a:schemeClr val="accent1"/>
+            </a:lnRef>
+            <a:fillRef idx="0">
+              <a:schemeClr val="accent1"/>
+            </a:fillRef>
+            <a:effectRef idx="0">
+              <a:schemeClr val="accent1"/>
+            </a:effectRef>
+            <a:fontRef idx="minor">
+              <a:schemeClr val="tx1"/>
+            </a:fontRef>
+          </p:style>
+        </p:cxnSp>
+        <p:cxnSp>
+          <p:nvCxnSpPr>
+            <p:cNvPr id="80" name="직선 연결선 79"/>
+            <p:cNvCxnSpPr>
+              <a:stCxn id="45" idx="3"/>
+              <a:endCxn id="46" idx="0"/>
+            </p:cNvCxnSpPr>
+            <p:nvPr/>
+          </p:nvCxnSpPr>
+          <p:spPr>
+            <a:xfrm flipH="1">
+              <a:off x="3747579" y="1978823"/>
+              <a:ext cx="1928413" cy="696519"/>
+            </a:xfrm>
+            <a:prstGeom prst="line">
+              <a:avLst/>
+            </a:prstGeom>
+            <a:ln>
+              <a:solidFill>
+                <a:schemeClr val="tx1"/>
+              </a:solidFill>
+            </a:ln>
+          </p:spPr>
+          <p:style>
+            <a:lnRef idx="1">
+              <a:schemeClr val="accent1"/>
+            </a:lnRef>
+            <a:fillRef idx="0">
+              <a:schemeClr val="accent1"/>
+            </a:fillRef>
+            <a:effectRef idx="0">
+              <a:schemeClr val="accent1"/>
+            </a:effectRef>
+            <a:fontRef idx="minor">
+              <a:schemeClr val="tx1"/>
+            </a:fontRef>
+          </p:style>
+        </p:cxnSp>
+        <p:cxnSp>
+          <p:nvCxnSpPr>
+            <p:cNvPr id="81" name="직선 연결선 80"/>
+            <p:cNvCxnSpPr>
+              <a:stCxn id="45" idx="5"/>
+              <a:endCxn id="47" idx="0"/>
+            </p:cNvCxnSpPr>
+            <p:nvPr/>
+          </p:nvCxnSpPr>
+          <p:spPr>
+            <a:xfrm>
+              <a:off x="6057830" y="1978823"/>
+              <a:ext cx="1928412" cy="696519"/>
+            </a:xfrm>
+            <a:prstGeom prst="line">
+              <a:avLst/>
+            </a:prstGeom>
+            <a:ln>
+              <a:solidFill>
+                <a:schemeClr val="tx1"/>
+              </a:solidFill>
+            </a:ln>
+          </p:spPr>
+          <p:style>
+            <a:lnRef idx="1">
+              <a:schemeClr val="accent1"/>
+            </a:lnRef>
+            <a:fillRef idx="0">
+              <a:schemeClr val="accent1"/>
+            </a:fillRef>
+            <a:effectRef idx="0">
+              <a:schemeClr val="accent1"/>
+            </a:effectRef>
+            <a:fontRef idx="minor">
+              <a:schemeClr val="tx1"/>
+            </a:fontRef>
+          </p:style>
+        </p:cxnSp>
+      </p:grpSp>
+      <p:grpSp>
+        <p:nvGrpSpPr>
+          <p:cNvPr id="82" name="그룹 81"/>
+          <p:cNvGrpSpPr/>
+          <p:nvPr/>
+        </p:nvGrpSpPr>
+        <p:grpSpPr>
+          <a:xfrm>
+            <a:off x="326533" y="4456806"/>
+            <a:ext cx="3564000" cy="1881167"/>
+            <a:chOff x="171510" y="1564608"/>
+            <a:chExt cx="3564000" cy="1881167"/>
+          </a:xfrm>
+        </p:grpSpPr>
+        <p:grpSp>
+          <p:nvGrpSpPr>
+            <p:cNvPr id="83" name="그룹 82"/>
+            <p:cNvGrpSpPr/>
+            <p:nvPr/>
+          </p:nvGrpSpPr>
+          <p:grpSpPr>
+            <a:xfrm>
+              <a:off x="171510" y="1564608"/>
+              <a:ext cx="2952000" cy="360000"/>
+              <a:chOff x="407092" y="872085"/>
+              <a:chExt cx="2952000" cy="360000"/>
+            </a:xfrm>
+          </p:grpSpPr>
+          <p:sp>
+            <p:nvSpPr>
+              <p:cNvPr id="93" name="타원 92"/>
+              <p:cNvSpPr/>
+              <p:nvPr/>
+            </p:nvSpPr>
+            <p:spPr>
+              <a:xfrm>
+                <a:off x="407092" y="872085"/>
+                <a:ext cx="360000" cy="360000"/>
+              </a:xfrm>
+              <a:prstGeom prst="ellipse">
+                <a:avLst/>
+              </a:prstGeom>
+              <a:solidFill>
+                <a:srgbClr val="1CC9E4"/>
+              </a:solidFill>
+              <a:ln>
+                <a:noFill/>
+              </a:ln>
+            </p:spPr>
+            <p:style>
+              <a:lnRef idx="2">
+                <a:schemeClr val="accent1">
+                  <a:shade val="50000"/>
+                </a:schemeClr>
+              </a:lnRef>
+              <a:fillRef idx="1">
+                <a:schemeClr val="accent1"/>
+              </a:fillRef>
+              <a:effectRef idx="0">
+                <a:schemeClr val="accent1"/>
+              </a:effectRef>
+              <a:fontRef idx="minor">
+                <a:schemeClr val="lt1"/>
+              </a:fontRef>
+            </p:style>
+            <p:txBody>
+              <a:bodyPr lIns="0" tIns="0" rIns="0" bIns="0" rtlCol="0" anchor="ctr"/>
+              <a:lstStyle/>
+              <a:p>
+                <a:pPr algn="ctr"/>
+                <a:endParaRPr lang="ko-KR" altLang="en-US" sz="1200" dirty="0">
+                  <a:solidFill>
+                    <a:schemeClr val="accent5"/>
+                  </a:solidFill>
+                  <a:latin typeface="삼성긴고딕OTF Medium" panose="020B0600000101010101" pitchFamily="34" charset="-127"/>
+                  <a:ea typeface="삼성긴고딕OTF Medium" panose="020B0600000101010101" pitchFamily="34" charset="-127"/>
+                </a:endParaRPr>
+              </a:p>
+            </p:txBody>
+          </p:sp>
+          <p:sp>
+            <p:nvSpPr>
+              <p:cNvPr id="94" name="직사각형 93"/>
+              <p:cNvSpPr/>
+              <p:nvPr/>
+            </p:nvSpPr>
+            <p:spPr>
+              <a:xfrm>
+                <a:off x="767092" y="872085"/>
+                <a:ext cx="2592000" cy="360000"/>
+              </a:xfrm>
+              <a:prstGeom prst="rect">
+                <a:avLst/>
+              </a:prstGeom>
+              <a:noFill/>
+              <a:ln>
+                <a:noFill/>
+              </a:ln>
+            </p:spPr>
+            <p:style>
+              <a:lnRef idx="2">
+                <a:schemeClr val="accent1">
+                  <a:shade val="50000"/>
+                </a:schemeClr>
+              </a:lnRef>
+              <a:fillRef idx="1">
+                <a:schemeClr val="accent1"/>
+              </a:fillRef>
+              <a:effectRef idx="0">
+                <a:schemeClr val="accent1"/>
+              </a:effectRef>
+              <a:fontRef idx="minor">
+                <a:schemeClr val="lt1"/>
+              </a:fontRef>
+            </p:style>
+            <p:txBody>
+              <a:bodyPr rtlCol="0" anchor="ctr"/>
+              <a:lstStyle/>
+              <a:p>
+                <a:r>
+                  <a:rPr lang="ko-KR" altLang="en-US" sz="1400" dirty="0" smtClean="0">
+                    <a:solidFill>
+                      <a:schemeClr val="tx1"/>
+                    </a:solidFill>
+                    <a:latin typeface="삼성긴고딕OTF Light" panose="020B0600000101010101" pitchFamily="34" charset="-127"/>
+                    <a:ea typeface="삼성긴고딕OTF Light" panose="020B0600000101010101" pitchFamily="34" charset="-127"/>
+                  </a:rPr>
+                  <a:t>값을 변경해야 하는 노드</a:t>
+                </a:r>
+                <a:r>
+                  <a:rPr lang="en-US" altLang="ko-KR" sz="1400" dirty="0" smtClean="0">
+                    <a:solidFill>
+                      <a:schemeClr val="tx1"/>
+                    </a:solidFill>
+                    <a:latin typeface="삼성긴고딕OTF Light" panose="020B0600000101010101" pitchFamily="34" charset="-127"/>
+                    <a:ea typeface="삼성긴고딕OTF Light" panose="020B0600000101010101" pitchFamily="34" charset="-127"/>
+                  </a:rPr>
+                  <a:t/>
+                </a:r>
+                <a:br>
+                  <a:rPr lang="en-US" altLang="ko-KR" sz="1400" dirty="0" smtClean="0">
+                    <a:solidFill>
+                      <a:schemeClr val="tx1"/>
+                    </a:solidFill>
+                    <a:latin typeface="삼성긴고딕OTF Light" panose="020B0600000101010101" pitchFamily="34" charset="-127"/>
+                    <a:ea typeface="삼성긴고딕OTF Light" panose="020B0600000101010101" pitchFamily="34" charset="-127"/>
+                  </a:rPr>
+                </a:br>
+                <a:r>
+                  <a:rPr lang="en-US" altLang="ko-KR" sz="1400" dirty="0" smtClean="0">
+                    <a:solidFill>
+                      <a:srgbClr val="1D75E5"/>
+                    </a:solidFill>
+                    <a:latin typeface="삼성긴고딕OTF Light" panose="020B0600000101010101" pitchFamily="34" charset="-127"/>
+                    <a:ea typeface="삼성긴고딕OTF Light" panose="020B0600000101010101" pitchFamily="34" charset="-127"/>
+                  </a:rPr>
+                  <a:t>(</a:t>
+                </a:r>
+                <a:r>
+                  <a:rPr lang="ko-KR" altLang="en-US" sz="1400" dirty="0" smtClean="0">
+                    <a:solidFill>
+                      <a:srgbClr val="1D75E5"/>
+                    </a:solidFill>
+                    <a:latin typeface="삼성긴고딕OTF Light" panose="020B0600000101010101" pitchFamily="34" charset="-127"/>
+                    <a:ea typeface="삼성긴고딕OTF Light" panose="020B0600000101010101" pitchFamily="34" charset="-127"/>
+                  </a:rPr>
+                  <a:t>구간의 일부만 포함</a:t>
+                </a:r>
+                <a:r>
+                  <a:rPr lang="en-US" altLang="ko-KR" sz="1400" dirty="0" smtClean="0">
+                    <a:solidFill>
+                      <a:srgbClr val="1D75E5"/>
+                    </a:solidFill>
+                    <a:latin typeface="삼성긴고딕OTF Light" panose="020B0600000101010101" pitchFamily="34" charset="-127"/>
+                    <a:ea typeface="삼성긴고딕OTF Light" panose="020B0600000101010101" pitchFamily="34" charset="-127"/>
+                  </a:rPr>
+                  <a:t>)</a:t>
+                </a:r>
+                <a:endParaRPr lang="ko-KR" altLang="en-US" sz="1400" dirty="0">
+                  <a:solidFill>
+                    <a:srgbClr val="1D75E5"/>
+                  </a:solidFill>
+                  <a:latin typeface="삼성긴고딕OTF Light" panose="020B0600000101010101" pitchFamily="34" charset="-127"/>
+                  <a:ea typeface="삼성긴고딕OTF Light" panose="020B0600000101010101" pitchFamily="34" charset="-127"/>
+                </a:endParaRPr>
+              </a:p>
+            </p:txBody>
+          </p:sp>
+        </p:grpSp>
+        <p:grpSp>
+          <p:nvGrpSpPr>
+            <p:cNvPr id="84" name="그룹 83"/>
+            <p:cNvGrpSpPr/>
+            <p:nvPr/>
+          </p:nvGrpSpPr>
+          <p:grpSpPr>
+            <a:xfrm>
+              <a:off x="171510" y="2066117"/>
+              <a:ext cx="3564000" cy="360000"/>
+              <a:chOff x="407092" y="1517904"/>
+              <a:chExt cx="3564000" cy="360000"/>
+            </a:xfrm>
+          </p:grpSpPr>
+          <p:sp>
+            <p:nvSpPr>
+              <p:cNvPr id="91" name="타원 90"/>
+              <p:cNvSpPr/>
+              <p:nvPr/>
+            </p:nvSpPr>
+            <p:spPr>
+              <a:xfrm>
+                <a:off x="407092" y="1517904"/>
+                <a:ext cx="360000" cy="360000"/>
+              </a:xfrm>
+              <a:prstGeom prst="ellipse">
+                <a:avLst/>
+              </a:prstGeom>
+              <a:solidFill>
+                <a:srgbClr val="15D3B2"/>
+              </a:solidFill>
+              <a:ln>
+                <a:noFill/>
+              </a:ln>
+            </p:spPr>
+            <p:style>
+              <a:lnRef idx="2">
+                <a:schemeClr val="accent1">
+                  <a:shade val="50000"/>
+                </a:schemeClr>
+              </a:lnRef>
+              <a:fillRef idx="1">
+                <a:schemeClr val="accent1"/>
+              </a:fillRef>
+              <a:effectRef idx="0">
+                <a:schemeClr val="accent1"/>
+              </a:effectRef>
+              <a:fontRef idx="minor">
+                <a:schemeClr val="lt1"/>
+              </a:fontRef>
+            </p:style>
+            <p:txBody>
+              <a:bodyPr lIns="0" tIns="0" rIns="0" bIns="0" rtlCol="0" anchor="ctr"/>
+              <a:lstStyle/>
+              <a:p>
+                <a:pPr algn="ctr"/>
+                <a:endParaRPr lang="ko-KR" altLang="en-US" sz="1200" dirty="0">
+                  <a:solidFill>
+                    <a:schemeClr val="accent5"/>
+                  </a:solidFill>
+                  <a:latin typeface="삼성긴고딕OTF Medium" panose="020B0600000101010101" pitchFamily="34" charset="-127"/>
+                  <a:ea typeface="삼성긴고딕OTF Medium" panose="020B0600000101010101" pitchFamily="34" charset="-127"/>
+                </a:endParaRPr>
+              </a:p>
+            </p:txBody>
+          </p:sp>
+          <p:sp>
+            <p:nvSpPr>
+              <p:cNvPr id="92" name="직사각형 91"/>
+              <p:cNvSpPr/>
+              <p:nvPr/>
+            </p:nvSpPr>
+            <p:spPr>
+              <a:xfrm>
+                <a:off x="767092" y="1517904"/>
+                <a:ext cx="3204000" cy="360000"/>
+              </a:xfrm>
+              <a:prstGeom prst="rect">
+                <a:avLst/>
+              </a:prstGeom>
+              <a:noFill/>
+              <a:ln>
+                <a:noFill/>
+              </a:ln>
+            </p:spPr>
+            <p:style>
+              <a:lnRef idx="2">
+                <a:schemeClr val="accent1">
+                  <a:shade val="50000"/>
+                </a:schemeClr>
+              </a:lnRef>
+              <a:fillRef idx="1">
+                <a:schemeClr val="accent1"/>
+              </a:fillRef>
+              <a:effectRef idx="0">
+                <a:schemeClr val="accent1"/>
+              </a:effectRef>
+              <a:fontRef idx="minor">
+                <a:schemeClr val="lt1"/>
+              </a:fontRef>
+            </p:style>
+            <p:txBody>
+              <a:bodyPr rtlCol="0" anchor="ctr"/>
+              <a:lstStyle/>
+              <a:p>
+                <a:r>
+                  <a:rPr lang="ko-KR" altLang="en-US" sz="1400" dirty="0" smtClean="0">
+                    <a:solidFill>
+                      <a:schemeClr val="tx1"/>
+                    </a:solidFill>
+                    <a:latin typeface="삼성긴고딕OTF Light" panose="020B0600000101010101" pitchFamily="34" charset="-127"/>
+                    <a:ea typeface="삼성긴고딕OTF Light" panose="020B0600000101010101" pitchFamily="34" charset="-127"/>
+                  </a:rPr>
+                  <a:t>서브 트리의 모든 값을 변경해야 하는 노드</a:t>
+                </a:r>
+                <a:endParaRPr lang="ko-KR" altLang="en-US" sz="1400" dirty="0">
+                  <a:solidFill>
+                    <a:schemeClr val="tx1"/>
+                  </a:solidFill>
+                  <a:latin typeface="삼성긴고딕OTF Light" panose="020B0600000101010101" pitchFamily="34" charset="-127"/>
+                  <a:ea typeface="삼성긴고딕OTF Light" panose="020B0600000101010101" pitchFamily="34" charset="-127"/>
+                </a:endParaRPr>
+              </a:p>
+            </p:txBody>
+          </p:sp>
+        </p:grpSp>
+        <p:grpSp>
+          <p:nvGrpSpPr>
+            <p:cNvPr id="85" name="그룹 84"/>
+            <p:cNvGrpSpPr/>
+            <p:nvPr/>
+          </p:nvGrpSpPr>
+          <p:grpSpPr>
+            <a:xfrm>
+              <a:off x="171510" y="2567626"/>
+              <a:ext cx="2952000" cy="376641"/>
+              <a:chOff x="407092" y="2147082"/>
+              <a:chExt cx="2952000" cy="376641"/>
+            </a:xfrm>
+          </p:grpSpPr>
+          <p:sp>
+            <p:nvSpPr>
+              <p:cNvPr id="89" name="타원 88"/>
+              <p:cNvSpPr/>
+              <p:nvPr/>
+            </p:nvSpPr>
+            <p:spPr>
+              <a:xfrm>
+                <a:off x="407092" y="2163723"/>
+                <a:ext cx="360000" cy="360000"/>
+              </a:xfrm>
+              <a:prstGeom prst="ellipse">
+                <a:avLst/>
+              </a:prstGeom>
+              <a:solidFill>
+                <a:srgbClr val="1D75E5"/>
+              </a:solidFill>
+              <a:ln>
+                <a:noFill/>
+              </a:ln>
+            </p:spPr>
+            <p:style>
+              <a:lnRef idx="2">
+                <a:schemeClr val="accent1">
+                  <a:shade val="50000"/>
+                </a:schemeClr>
+              </a:lnRef>
+              <a:fillRef idx="1">
+                <a:schemeClr val="accent1"/>
+              </a:fillRef>
+              <a:effectRef idx="0">
+                <a:schemeClr val="accent1"/>
+              </a:effectRef>
+              <a:fontRef idx="minor">
+                <a:schemeClr val="lt1"/>
+              </a:fontRef>
+            </p:style>
+            <p:txBody>
+              <a:bodyPr lIns="0" tIns="0" rIns="0" bIns="0" rtlCol="0" anchor="ctr"/>
+              <a:lstStyle/>
+              <a:p>
+                <a:pPr algn="ctr"/>
+                <a:endParaRPr lang="ko-KR" altLang="en-US" sz="1200" dirty="0">
+                  <a:solidFill>
+                    <a:schemeClr val="accent5"/>
+                  </a:solidFill>
+                  <a:latin typeface="삼성긴고딕OTF Medium" panose="020B0600000101010101" pitchFamily="34" charset="-127"/>
+                  <a:ea typeface="삼성긴고딕OTF Medium" panose="020B0600000101010101" pitchFamily="34" charset="-127"/>
+                </a:endParaRPr>
+              </a:p>
+            </p:txBody>
+          </p:sp>
+          <p:sp>
+            <p:nvSpPr>
+              <p:cNvPr id="90" name="직사각형 89"/>
+              <p:cNvSpPr/>
+              <p:nvPr/>
+            </p:nvSpPr>
+            <p:spPr>
+              <a:xfrm>
+                <a:off x="767092" y="2147082"/>
+                <a:ext cx="2592000" cy="360000"/>
+              </a:xfrm>
+              <a:prstGeom prst="rect">
+                <a:avLst/>
+              </a:prstGeom>
+              <a:noFill/>
+              <a:ln>
+                <a:noFill/>
+              </a:ln>
+            </p:spPr>
+            <p:style>
+              <a:lnRef idx="2">
+                <a:schemeClr val="accent1">
+                  <a:shade val="50000"/>
+                </a:schemeClr>
+              </a:lnRef>
+              <a:fillRef idx="1">
+                <a:schemeClr val="accent1"/>
+              </a:fillRef>
+              <a:effectRef idx="0">
+                <a:schemeClr val="accent1"/>
+              </a:effectRef>
+              <a:fontRef idx="minor">
+                <a:schemeClr val="lt1"/>
+              </a:fontRef>
+            </p:style>
+            <p:txBody>
+              <a:bodyPr rtlCol="0" anchor="ctr"/>
+              <a:lstStyle/>
+              <a:p>
+                <a:r>
+                  <a:rPr lang="ko-KR" altLang="en-US" sz="1400" dirty="0" smtClean="0">
+                    <a:solidFill>
+                      <a:schemeClr val="tx1"/>
+                    </a:solidFill>
+                    <a:latin typeface="삼성긴고딕OTF Light" panose="020B0600000101010101" pitchFamily="34" charset="-127"/>
+                    <a:ea typeface="삼성긴고딕OTF Light" panose="020B0600000101010101" pitchFamily="34" charset="-127"/>
+                  </a:rPr>
+                  <a:t>값을 변경해야 하는 리프 노드</a:t>
+                </a:r>
+                <a:r>
+                  <a:rPr lang="en-US" altLang="ko-KR" sz="1400" dirty="0" smtClean="0">
+                    <a:solidFill>
+                      <a:schemeClr val="tx1"/>
+                    </a:solidFill>
+                    <a:latin typeface="삼성긴고딕OTF Light" panose="020B0600000101010101" pitchFamily="34" charset="-127"/>
+                    <a:ea typeface="삼성긴고딕OTF Light" panose="020B0600000101010101" pitchFamily="34" charset="-127"/>
+                  </a:rPr>
+                  <a:t/>
+                </a:r>
+                <a:br>
+                  <a:rPr lang="en-US" altLang="ko-KR" sz="1400" dirty="0" smtClean="0">
+                    <a:solidFill>
+                      <a:schemeClr val="tx1"/>
+                    </a:solidFill>
+                    <a:latin typeface="삼성긴고딕OTF Light" panose="020B0600000101010101" pitchFamily="34" charset="-127"/>
+                    <a:ea typeface="삼성긴고딕OTF Light" panose="020B0600000101010101" pitchFamily="34" charset="-127"/>
+                  </a:rPr>
+                </a:br>
+                <a:r>
+                  <a:rPr lang="en-US" altLang="ko-KR" sz="1400" dirty="0" smtClean="0">
+                    <a:solidFill>
+                      <a:srgbClr val="FF0000"/>
+                    </a:solidFill>
+                    <a:latin typeface="삼성긴고딕OTF Light" panose="020B0600000101010101" pitchFamily="34" charset="-127"/>
+                    <a:ea typeface="삼성긴고딕OTF Light" panose="020B0600000101010101" pitchFamily="34" charset="-127"/>
+                  </a:rPr>
+                  <a:t>(</a:t>
+                </a:r>
+                <a:r>
+                  <a:rPr lang="ko-KR" altLang="en-US" sz="1400" dirty="0" smtClean="0">
+                    <a:solidFill>
+                      <a:srgbClr val="FF0000"/>
+                    </a:solidFill>
+                    <a:latin typeface="삼성긴고딕OTF Light" panose="020B0600000101010101" pitchFamily="34" charset="-127"/>
+                    <a:ea typeface="삼성긴고딕OTF Light" panose="020B0600000101010101" pitchFamily="34" charset="-127"/>
+                  </a:rPr>
+                  <a:t>나중에 변경해도 됨</a:t>
+                </a:r>
+                <a:r>
+                  <a:rPr lang="en-US" altLang="ko-KR" sz="1400" dirty="0" smtClean="0">
+                    <a:solidFill>
+                      <a:srgbClr val="FF0000"/>
+                    </a:solidFill>
+                    <a:latin typeface="삼성긴고딕OTF Light" panose="020B0600000101010101" pitchFamily="34" charset="-127"/>
+                    <a:ea typeface="삼성긴고딕OTF Light" panose="020B0600000101010101" pitchFamily="34" charset="-127"/>
+                  </a:rPr>
+                  <a:t>)</a:t>
+                </a:r>
+                <a:endParaRPr lang="ko-KR" altLang="en-US" sz="1400" dirty="0">
+                  <a:solidFill>
+                    <a:srgbClr val="FF0000"/>
+                  </a:solidFill>
+                  <a:latin typeface="삼성긴고딕OTF Light" panose="020B0600000101010101" pitchFamily="34" charset="-127"/>
+                  <a:ea typeface="삼성긴고딕OTF Light" panose="020B0600000101010101" pitchFamily="34" charset="-127"/>
+                </a:endParaRPr>
+              </a:p>
+            </p:txBody>
+          </p:sp>
+        </p:grpSp>
+        <p:grpSp>
+          <p:nvGrpSpPr>
+            <p:cNvPr id="86" name="그룹 85"/>
+            <p:cNvGrpSpPr/>
+            <p:nvPr/>
+          </p:nvGrpSpPr>
+          <p:grpSpPr>
+            <a:xfrm>
+              <a:off x="171510" y="3085775"/>
+              <a:ext cx="3024000" cy="360000"/>
+              <a:chOff x="407092" y="1517904"/>
+              <a:chExt cx="3024000" cy="360000"/>
+            </a:xfrm>
+          </p:grpSpPr>
+          <p:sp>
+            <p:nvSpPr>
+              <p:cNvPr id="87" name="타원 86"/>
+              <p:cNvSpPr/>
+              <p:nvPr/>
+            </p:nvSpPr>
+            <p:spPr>
+              <a:xfrm>
+                <a:off x="407092" y="1517904"/>
+                <a:ext cx="360000" cy="360000"/>
+              </a:xfrm>
+              <a:prstGeom prst="ellipse">
+                <a:avLst/>
+              </a:prstGeom>
+              <a:solidFill>
+                <a:srgbClr val="E62154"/>
+              </a:solidFill>
+              <a:ln>
+                <a:noFill/>
+              </a:ln>
+            </p:spPr>
+            <p:style>
+              <a:lnRef idx="2">
+                <a:schemeClr val="accent1">
+                  <a:shade val="50000"/>
+                </a:schemeClr>
+              </a:lnRef>
+              <a:fillRef idx="1">
+                <a:schemeClr val="accent1"/>
+              </a:fillRef>
+              <a:effectRef idx="0">
+                <a:schemeClr val="accent1"/>
+              </a:effectRef>
+              <a:fontRef idx="minor">
+                <a:schemeClr val="lt1"/>
+              </a:fontRef>
+            </p:style>
+            <p:txBody>
+              <a:bodyPr lIns="0" tIns="0" rIns="0" bIns="0" rtlCol="0" anchor="ctr"/>
+              <a:lstStyle/>
+              <a:p>
+                <a:pPr algn="ctr"/>
+                <a:endParaRPr lang="ko-KR" altLang="en-US" sz="1200" dirty="0">
+                  <a:solidFill>
+                    <a:schemeClr val="accent5"/>
+                  </a:solidFill>
+                  <a:latin typeface="삼성긴고딕OTF Medium" panose="020B0600000101010101" pitchFamily="34" charset="-127"/>
+                  <a:ea typeface="삼성긴고딕OTF Medium" panose="020B0600000101010101" pitchFamily="34" charset="-127"/>
+                </a:endParaRPr>
+              </a:p>
+            </p:txBody>
+          </p:sp>
+          <p:sp>
+            <p:nvSpPr>
+              <p:cNvPr id="88" name="직사각형 87"/>
+              <p:cNvSpPr/>
+              <p:nvPr/>
+            </p:nvSpPr>
+            <p:spPr>
+              <a:xfrm>
+                <a:off x="767092" y="1517904"/>
+                <a:ext cx="2664000" cy="360000"/>
+              </a:xfrm>
+              <a:prstGeom prst="rect">
+                <a:avLst/>
+              </a:prstGeom>
+              <a:noFill/>
+              <a:ln>
+                <a:noFill/>
+              </a:ln>
+            </p:spPr>
+            <p:style>
+              <a:lnRef idx="2">
+                <a:schemeClr val="accent1">
+                  <a:shade val="50000"/>
+                </a:schemeClr>
+              </a:lnRef>
+              <a:fillRef idx="1">
+                <a:schemeClr val="accent1"/>
+              </a:fillRef>
+              <a:effectRef idx="0">
+                <a:schemeClr val="accent1"/>
+              </a:effectRef>
+              <a:fontRef idx="minor">
+                <a:schemeClr val="lt1"/>
+              </a:fontRef>
+            </p:style>
+            <p:txBody>
+              <a:bodyPr rtlCol="0" anchor="ctr"/>
+              <a:lstStyle/>
+              <a:p>
+                <a:r>
+                  <a:rPr lang="ko-KR" altLang="en-US" sz="1400" dirty="0" smtClean="0">
+                    <a:solidFill>
+                      <a:schemeClr val="tx1"/>
+                    </a:solidFill>
+                    <a:latin typeface="삼성긴고딕OTF Light" panose="020B0600000101010101" pitchFamily="34" charset="-127"/>
+                    <a:ea typeface="삼성긴고딕OTF Light" panose="020B0600000101010101" pitchFamily="34" charset="-127"/>
+                  </a:rPr>
+                  <a:t>저장된 값을 호출만 하면 되는 노드</a:t>
+                </a:r>
+                <a:endParaRPr lang="ko-KR" altLang="en-US" sz="1400" dirty="0">
+                  <a:solidFill>
+                    <a:schemeClr val="tx1"/>
+                  </a:solidFill>
+                  <a:latin typeface="삼성긴고딕OTF Light" panose="020B0600000101010101" pitchFamily="34" charset="-127"/>
+                  <a:ea typeface="삼성긴고딕OTF Light" panose="020B0600000101010101" pitchFamily="34" charset="-127"/>
+                </a:endParaRPr>
+              </a:p>
+            </p:txBody>
+          </p:sp>
+        </p:grpSp>
+      </p:grpSp>
+      <p:sp>
+        <p:nvSpPr>
+          <p:cNvPr id="95" name="직사각형 94"/>
+          <p:cNvSpPr/>
+          <p:nvPr/>
+        </p:nvSpPr>
+        <p:spPr>
+          <a:xfrm>
+            <a:off x="5263767" y="4744364"/>
+            <a:ext cx="3960000" cy="720000"/>
+          </a:xfrm>
+          <a:prstGeom prst="rect">
+            <a:avLst/>
+          </a:prstGeom>
+          <a:solidFill>
+            <a:srgbClr val="92D050">
+              <a:alpha val="20000"/>
+            </a:srgbClr>
+          </a:solidFill>
+          <a:ln>
+            <a:noFill/>
+          </a:ln>
+        </p:spPr>
+        <p:style>
+          <a:lnRef idx="2">
+            <a:schemeClr val="accent1">
+              <a:shade val="50000"/>
+            </a:schemeClr>
+          </a:lnRef>
+          <a:fillRef idx="1">
+            <a:schemeClr val="accent1"/>
+          </a:fillRef>
+          <a:effectRef idx="0">
+            <a:schemeClr val="accent1"/>
+          </a:effectRef>
+          <a:fontRef idx="minor">
+            <a:schemeClr val="lt1"/>
+          </a:fontRef>
+        </p:style>
+        <p:txBody>
+          <a:bodyPr rtlCol="0" anchor="ctr"/>
+          <a:lstStyle/>
+          <a:p>
+            <a:pPr algn="ctr"/>
+            <a:endParaRPr lang="ko-KR" altLang="en-US"/>
+          </a:p>
+        </p:txBody>
+      </p:sp>
+      <p:sp>
+        <p:nvSpPr>
+          <p:cNvPr id="96" name="TextBox 95"/>
+          <p:cNvSpPr txBox="1"/>
+          <p:nvPr/>
+        </p:nvSpPr>
+        <p:spPr>
+          <a:xfrm>
+            <a:off x="7052848" y="4421959"/>
+            <a:ext cx="328289" cy="369332"/>
+          </a:xfrm>
+          <a:prstGeom prst="rect">
+            <a:avLst/>
+          </a:prstGeom>
+          <a:noFill/>
+        </p:spPr>
+        <p:txBody>
+          <a:bodyPr wrap="square" rtlCol="0" anchor="ctr">
+            <a:spAutoFit/>
+          </a:bodyPr>
+          <a:lstStyle/>
+          <a:p>
+            <a:pPr algn="ctr"/>
+            <a:r>
+              <a:rPr lang="en-US" altLang="ko-KR" dirty="0" smtClean="0">
+                <a:solidFill>
+                  <a:srgbClr val="00B050"/>
+                </a:solidFill>
+                <a:latin typeface="삼성긴고딕OTF Medium" panose="020B0600000101010101" pitchFamily="34" charset="-127"/>
+                <a:ea typeface="삼성긴고딕OTF Medium" panose="020B0600000101010101" pitchFamily="34" charset="-127"/>
+              </a:rPr>
+              <a:t>2</a:t>
+            </a:r>
+            <a:endParaRPr lang="ko-KR" altLang="en-US" dirty="0">
+              <a:solidFill>
+                <a:srgbClr val="00B050"/>
+              </a:solidFill>
+              <a:latin typeface="삼성긴고딕OTF Medium" panose="020B0600000101010101" pitchFamily="34" charset="-127"/>
+              <a:ea typeface="삼성긴고딕OTF Medium" panose="020B0600000101010101" pitchFamily="34" charset="-127"/>
+            </a:endParaRPr>
+          </a:p>
+        </p:txBody>
+      </p:sp>
     </p:spTree>
     <p:extLst>
       <p:ext uri="{BB962C8B-B14F-4D97-AF65-F5344CB8AC3E}">
         <p14:creationId xmlns:p14="http://schemas.microsoft.com/office/powerpoint/2010/main" val="3300764673"/>
+      </p:ext>
+    </p:extLst>
+  </p:cSld>
+  <p:clrMapOvr>
+    <a:masterClrMapping/>
+  </p:clrMapOvr>
+  <p:timing>
+    <p:tnLst>
+      <p:par>
+        <p:cTn id="1" dur="indefinite" restart="never" nodeType="tmRoot"/>
+      </p:par>
+    </p:tnLst>
+  </p:timing>
+</p:sld>
+</file>
+
+<file path=ppt/slides/slide2.xml><?xml version="1.0" encoding="utf-8"?>
+<p:sld xmlns:a="http://schemas.openxmlformats.org/drawingml/2006/main" xmlns:r="http://schemas.openxmlformats.org/officeDocument/2006/relationships" xmlns:p="http://schemas.openxmlformats.org/presentationml/2006/main">
+  <p:cSld>
+    <p:spTree>
+      <p:nvGrpSpPr>
+        <p:cNvPr id="1" name=""/>
+        <p:cNvGrpSpPr/>
+        <p:nvPr/>
+      </p:nvGrpSpPr>
+      <p:grpSpPr>
+        <a:xfrm>
+          <a:off x="0" y="0"/>
+          <a:ext cx="0" cy="0"/>
+          <a:chOff x="0" y="0"/>
+          <a:chExt cx="0" cy="0"/>
+        </a:xfrm>
+      </p:grpSpPr>
+      <p:sp>
+        <p:nvSpPr>
+          <p:cNvPr id="5" name="U자형 화살표 4"/>
+          <p:cNvSpPr/>
+          <p:nvPr/>
+        </p:nvSpPr>
+        <p:spPr>
+          <a:xfrm rot="10800000" flipH="1">
+            <a:off x="2147482" y="1358264"/>
+            <a:ext cx="1930742" cy="3469767"/>
+          </a:xfrm>
+          <a:prstGeom prst="uturnArrow">
+            <a:avLst>
+              <a:gd name="adj1" fmla="val 12817"/>
+              <a:gd name="adj2" fmla="val 14344"/>
+              <a:gd name="adj3" fmla="val 21211"/>
+              <a:gd name="adj4" fmla="val 21964"/>
+              <a:gd name="adj5" fmla="val 99899"/>
+            </a:avLst>
+          </a:prstGeom>
+          <a:solidFill>
+            <a:srgbClr val="15D3B2">
+              <a:alpha val="40000"/>
+            </a:srgbClr>
+          </a:solidFill>
+          <a:ln>
+            <a:noFill/>
+          </a:ln>
+        </p:spPr>
+        <p:style>
+          <a:lnRef idx="2">
+            <a:schemeClr val="accent1">
+              <a:shade val="50000"/>
+            </a:schemeClr>
+          </a:lnRef>
+          <a:fillRef idx="1">
+            <a:schemeClr val="accent1"/>
+          </a:fillRef>
+          <a:effectRef idx="0">
+            <a:schemeClr val="accent1"/>
+          </a:effectRef>
+          <a:fontRef idx="minor">
+            <a:schemeClr val="lt1"/>
+          </a:fontRef>
+        </p:style>
+        <p:txBody>
+          <a:bodyPr rtlCol="0" anchor="ctr"/>
+          <a:lstStyle/>
+          <a:p>
+            <a:pPr algn="ctr"/>
+            <a:endParaRPr lang="ko-KR" altLang="en-US">
+              <a:solidFill>
+                <a:schemeClr val="tx1"/>
+              </a:solidFill>
+            </a:endParaRPr>
+          </a:p>
+        </p:txBody>
+      </p:sp>
+      <p:pic>
+        <p:nvPicPr>
+          <p:cNvPr id="1028" name="Picture 4" descr="https://cdn-icons-png.flaticon.com/512/893/893257.png"/>
+          <p:cNvPicPr>
+            <a:picLocks noChangeAspect="1" noChangeArrowheads="1"/>
+          </p:cNvPicPr>
+          <p:nvPr/>
+        </p:nvPicPr>
+        <p:blipFill>
+          <a:blip r:embed="rId2" cstate="print">
+            <a:extLst>
+              <a:ext uri="{28A0092B-C50C-407E-A947-70E740481C1C}">
+                <a14:useLocalDpi xmlns:a14="http://schemas.microsoft.com/office/drawing/2010/main" val="0"/>
+              </a:ext>
+            </a:extLst>
+          </a:blip>
+          <a:srcRect/>
+          <a:stretch>
+            <a:fillRect/>
+          </a:stretch>
+        </p:blipFill>
+        <p:spPr bwMode="auto">
+          <a:xfrm>
+            <a:off x="1999566" y="782265"/>
+            <a:ext cx="576000" cy="576000"/>
+          </a:xfrm>
+          <a:prstGeom prst="rect">
+            <a:avLst/>
+          </a:prstGeom>
+          <a:noFill/>
+          <a:extLst>
+            <a:ext uri="{909E8E84-426E-40DD-AFC4-6F175D3DCCD1}">
+              <a14:hiddenFill xmlns:a14="http://schemas.microsoft.com/office/drawing/2010/main">
+                <a:solidFill>
+                  <a:srgbClr val="FFFFFF"/>
+                </a:solidFill>
+              </a14:hiddenFill>
+            </a:ext>
+          </a:extLst>
+        </p:spPr>
+      </p:pic>
+      <p:pic>
+        <p:nvPicPr>
+          <p:cNvPr id="1032" name="Picture 8" descr="https://cdn-icons-png.flaticon.com/512/3770/3770214.png"/>
+          <p:cNvPicPr>
+            <a:picLocks noChangeAspect="1" noChangeArrowheads="1"/>
+          </p:cNvPicPr>
+          <p:nvPr/>
+        </p:nvPicPr>
+        <p:blipFill>
+          <a:blip r:embed="rId3" cstate="print">
+            <a:extLst>
+              <a:ext uri="{28A0092B-C50C-407E-A947-70E740481C1C}">
+                <a14:useLocalDpi xmlns:a14="http://schemas.microsoft.com/office/drawing/2010/main" val="0"/>
+              </a:ext>
+            </a:extLst>
+          </a:blip>
+          <a:srcRect/>
+          <a:stretch>
+            <a:fillRect/>
+          </a:stretch>
+        </p:blipFill>
+        <p:spPr bwMode="auto">
+          <a:xfrm>
+            <a:off x="1891566" y="1914579"/>
+            <a:ext cx="792000" cy="792000"/>
+          </a:xfrm>
+          <a:prstGeom prst="rect">
+            <a:avLst/>
+          </a:prstGeom>
+          <a:noFill/>
+          <a:extLst>
+            <a:ext uri="{909E8E84-426E-40DD-AFC4-6F175D3DCCD1}">
+              <a14:hiddenFill xmlns:a14="http://schemas.microsoft.com/office/drawing/2010/main">
+                <a:solidFill>
+                  <a:srgbClr val="FFFFFF"/>
+                </a:solidFill>
+              </a14:hiddenFill>
+            </a:ext>
+          </a:extLst>
+        </p:spPr>
+      </p:pic>
+      <p:pic>
+        <p:nvPicPr>
+          <p:cNvPr id="1036" name="Picture 12" descr="https://cdn-icons-png.flaticon.com/512/595/595472.png"/>
+          <p:cNvPicPr>
+            <a:picLocks noChangeAspect="1" noChangeArrowheads="1"/>
+          </p:cNvPicPr>
+          <p:nvPr/>
+        </p:nvPicPr>
+        <p:blipFill>
+          <a:blip r:embed="rId4" cstate="print">
+            <a:extLst>
+              <a:ext uri="{28A0092B-C50C-407E-A947-70E740481C1C}">
+                <a14:useLocalDpi xmlns:a14="http://schemas.microsoft.com/office/drawing/2010/main" val="0"/>
+              </a:ext>
+            </a:extLst>
+          </a:blip>
+          <a:srcRect/>
+          <a:stretch>
+            <a:fillRect/>
+          </a:stretch>
+        </p:blipFill>
+        <p:spPr bwMode="auto">
+          <a:xfrm>
+            <a:off x="1999566" y="3405238"/>
+            <a:ext cx="540000" cy="540000"/>
+          </a:xfrm>
+          <a:prstGeom prst="rect">
+            <a:avLst/>
+          </a:prstGeom>
+          <a:noFill/>
+          <a:extLst>
+            <a:ext uri="{909E8E84-426E-40DD-AFC4-6F175D3DCCD1}">
+              <a14:hiddenFill xmlns:a14="http://schemas.microsoft.com/office/drawing/2010/main">
+                <a:solidFill>
+                  <a:srgbClr val="FFFFFF"/>
+                </a:solidFill>
+              </a14:hiddenFill>
+            </a:ext>
+          </a:extLst>
+        </p:spPr>
+      </p:pic>
+      <p:pic>
+        <p:nvPicPr>
+          <p:cNvPr id="1038" name="Picture 14" descr="https://cdn-icons-png.flaticon.com/512/10112/10112526.png"/>
+          <p:cNvPicPr>
+            <a:picLocks noChangeAspect="1" noChangeArrowheads="1"/>
+          </p:cNvPicPr>
+          <p:nvPr/>
+        </p:nvPicPr>
+        <p:blipFill>
+          <a:blip r:embed="rId5" cstate="print">
+            <a:extLst>
+              <a:ext uri="{28A0092B-C50C-407E-A947-70E740481C1C}">
+                <a14:useLocalDpi xmlns:a14="http://schemas.microsoft.com/office/drawing/2010/main" val="0"/>
+              </a:ext>
+            </a:extLst>
+          </a:blip>
+          <a:srcRect/>
+          <a:stretch>
+            <a:fillRect/>
+          </a:stretch>
+        </p:blipFill>
+        <p:spPr bwMode="auto">
+          <a:xfrm>
+            <a:off x="2539566" y="4189429"/>
+            <a:ext cx="1080000" cy="1080000"/>
+          </a:xfrm>
+          <a:prstGeom prst="rect">
+            <a:avLst/>
+          </a:prstGeom>
+          <a:noFill/>
+          <a:extLst>
+            <a:ext uri="{909E8E84-426E-40DD-AFC4-6F175D3DCCD1}">
+              <a14:hiddenFill xmlns:a14="http://schemas.microsoft.com/office/drawing/2010/main">
+                <a:solidFill>
+                  <a:srgbClr val="FFFFFF"/>
+                </a:solidFill>
+              </a14:hiddenFill>
+            </a:ext>
+          </a:extLst>
+        </p:spPr>
+      </p:pic>
+      <p:sp>
+        <p:nvSpPr>
+          <p:cNvPr id="13" name="직사각형 12"/>
+          <p:cNvSpPr/>
+          <p:nvPr/>
+        </p:nvSpPr>
+        <p:spPr>
+          <a:xfrm>
+            <a:off x="2675106" y="890265"/>
+            <a:ext cx="720000" cy="360000"/>
+          </a:xfrm>
+          <a:prstGeom prst="rect">
+            <a:avLst/>
+          </a:prstGeom>
+          <a:noFill/>
+          <a:ln>
+            <a:noFill/>
+          </a:ln>
+        </p:spPr>
+        <p:style>
+          <a:lnRef idx="2">
+            <a:schemeClr val="accent1">
+              <a:shade val="50000"/>
+            </a:schemeClr>
+          </a:lnRef>
+          <a:fillRef idx="1">
+            <a:schemeClr val="accent1"/>
+          </a:fillRef>
+          <a:effectRef idx="0">
+            <a:schemeClr val="accent1"/>
+          </a:effectRef>
+          <a:fontRef idx="minor">
+            <a:schemeClr val="lt1"/>
+          </a:fontRef>
+        </p:style>
+        <p:txBody>
+          <a:bodyPr rtlCol="0" anchor="ctr"/>
+          <a:lstStyle/>
+          <a:p>
+            <a:pPr algn="ctr"/>
+            <a:r>
+              <a:rPr lang="ko-KR" altLang="en-US" sz="1050" dirty="0" smtClean="0">
+                <a:solidFill>
+                  <a:srgbClr val="FF0000"/>
+                </a:solidFill>
+                <a:latin typeface="삼성긴고딕OTF Light" panose="020B0600000101010101" pitchFamily="34" charset="-127"/>
+                <a:ea typeface="삼성긴고딕OTF Light" panose="020B0600000101010101" pitchFamily="34" charset="-127"/>
+              </a:rPr>
+              <a:t>메시지</a:t>
+            </a:r>
+            <a:endParaRPr lang="ko-KR" altLang="en-US" sz="1050" dirty="0">
+              <a:solidFill>
+                <a:srgbClr val="FF0000"/>
+              </a:solidFill>
+              <a:latin typeface="삼성긴고딕OTF Light" panose="020B0600000101010101" pitchFamily="34" charset="-127"/>
+              <a:ea typeface="삼성긴고딕OTF Light" panose="020B0600000101010101" pitchFamily="34" charset="-127"/>
+            </a:endParaRPr>
+          </a:p>
+        </p:txBody>
+      </p:sp>
+      <p:sp>
+        <p:nvSpPr>
+          <p:cNvPr id="14" name="직사각형 13"/>
+          <p:cNvSpPr/>
+          <p:nvPr/>
+        </p:nvSpPr>
+        <p:spPr>
+          <a:xfrm>
+            <a:off x="2675106" y="2186671"/>
+            <a:ext cx="720000" cy="360000"/>
+          </a:xfrm>
+          <a:prstGeom prst="rect">
+            <a:avLst/>
+          </a:prstGeom>
+          <a:noFill/>
+          <a:ln>
+            <a:noFill/>
+          </a:ln>
+        </p:spPr>
+        <p:style>
+          <a:lnRef idx="2">
+            <a:schemeClr val="accent1">
+              <a:shade val="50000"/>
+            </a:schemeClr>
+          </a:lnRef>
+          <a:fillRef idx="1">
+            <a:schemeClr val="accent1"/>
+          </a:fillRef>
+          <a:effectRef idx="0">
+            <a:schemeClr val="accent1"/>
+          </a:effectRef>
+          <a:fontRef idx="minor">
+            <a:schemeClr val="lt1"/>
+          </a:fontRef>
+        </p:style>
+        <p:txBody>
+          <a:bodyPr rtlCol="0" anchor="ctr"/>
+          <a:lstStyle/>
+          <a:p>
+            <a:pPr algn="ctr"/>
+            <a:r>
+              <a:rPr lang="ko-KR" altLang="en-US" sz="1050" dirty="0" smtClean="0">
+                <a:solidFill>
+                  <a:srgbClr val="FF0000"/>
+                </a:solidFill>
+                <a:latin typeface="삼성긴고딕OTF Light" panose="020B0600000101010101" pitchFamily="34" charset="-127"/>
+                <a:ea typeface="삼성긴고딕OTF Light" panose="020B0600000101010101" pitchFamily="34" charset="-127"/>
+              </a:rPr>
+              <a:t>세그먼트</a:t>
+            </a:r>
+            <a:endParaRPr lang="ko-KR" altLang="en-US" sz="1050" dirty="0">
+              <a:solidFill>
+                <a:srgbClr val="FF0000"/>
+              </a:solidFill>
+              <a:latin typeface="삼성긴고딕OTF Light" panose="020B0600000101010101" pitchFamily="34" charset="-127"/>
+              <a:ea typeface="삼성긴고딕OTF Light" panose="020B0600000101010101" pitchFamily="34" charset="-127"/>
+            </a:endParaRPr>
+          </a:p>
+        </p:txBody>
+      </p:sp>
+      <p:pic>
+        <p:nvPicPr>
+          <p:cNvPr id="15" name="Picture 8" descr="https://cdn-icons-png.flaticon.com/512/3770/3770214.png"/>
+          <p:cNvPicPr>
+            <a:picLocks noChangeAspect="1" noChangeArrowheads="1"/>
+          </p:cNvPicPr>
+          <p:nvPr/>
+        </p:nvPicPr>
+        <p:blipFill>
+          <a:blip r:embed="rId3" cstate="print">
+            <a:extLst>
+              <a:ext uri="{28A0092B-C50C-407E-A947-70E740481C1C}">
+                <a14:useLocalDpi xmlns:a14="http://schemas.microsoft.com/office/drawing/2010/main" val="0"/>
+              </a:ext>
+            </a:extLst>
+          </a:blip>
+          <a:srcRect/>
+          <a:stretch>
+            <a:fillRect/>
+          </a:stretch>
+        </p:blipFill>
+        <p:spPr bwMode="auto">
+          <a:xfrm>
+            <a:off x="3370544" y="1914579"/>
+            <a:ext cx="792000" cy="792000"/>
+          </a:xfrm>
+          <a:prstGeom prst="rect">
+            <a:avLst/>
+          </a:prstGeom>
+          <a:noFill/>
+          <a:extLst>
+            <a:ext uri="{909E8E84-426E-40DD-AFC4-6F175D3DCCD1}">
+              <a14:hiddenFill xmlns:a14="http://schemas.microsoft.com/office/drawing/2010/main">
+                <a:solidFill>
+                  <a:srgbClr val="FFFFFF"/>
+                </a:solidFill>
+              </a14:hiddenFill>
+            </a:ext>
+          </a:extLst>
+        </p:spPr>
+      </p:pic>
+      <p:pic>
+        <p:nvPicPr>
+          <p:cNvPr id="16" name="Picture 4" descr="https://cdn-icons-png.flaticon.com/512/893/893257.png"/>
+          <p:cNvPicPr>
+            <a:picLocks noChangeAspect="1" noChangeArrowheads="1"/>
+          </p:cNvPicPr>
+          <p:nvPr/>
+        </p:nvPicPr>
+        <p:blipFill>
+          <a:blip r:embed="rId2" cstate="print">
+            <a:extLst>
+              <a:ext uri="{28A0092B-C50C-407E-A947-70E740481C1C}">
+                <a14:useLocalDpi xmlns:a14="http://schemas.microsoft.com/office/drawing/2010/main" val="0"/>
+              </a:ext>
+            </a:extLst>
+          </a:blip>
+          <a:srcRect/>
+          <a:stretch>
+            <a:fillRect/>
+          </a:stretch>
+        </p:blipFill>
+        <p:spPr bwMode="auto">
+          <a:xfrm>
+            <a:off x="3494646" y="782265"/>
+            <a:ext cx="576000" cy="576000"/>
+          </a:xfrm>
+          <a:prstGeom prst="rect">
+            <a:avLst/>
+          </a:prstGeom>
+          <a:noFill/>
+          <a:extLst>
+            <a:ext uri="{909E8E84-426E-40DD-AFC4-6F175D3DCCD1}">
+              <a14:hiddenFill xmlns:a14="http://schemas.microsoft.com/office/drawing/2010/main">
+                <a:solidFill>
+                  <a:srgbClr val="FFFFFF"/>
+                </a:solidFill>
+              </a14:hiddenFill>
+            </a:ext>
+          </a:extLst>
+        </p:spPr>
+      </p:pic>
+      <p:pic>
+        <p:nvPicPr>
+          <p:cNvPr id="18" name="Picture 10" descr="https://cdn-icons-png.flaticon.com/512/685/685391.png"/>
+          <p:cNvPicPr>
+            <a:picLocks noChangeAspect="1" noChangeArrowheads="1"/>
+          </p:cNvPicPr>
+          <p:nvPr/>
+        </p:nvPicPr>
+        <p:blipFill>
+          <a:blip r:embed="rId6" cstate="print">
+            <a:extLst>
+              <a:ext uri="{28A0092B-C50C-407E-A947-70E740481C1C}">
+                <a14:useLocalDpi xmlns:a14="http://schemas.microsoft.com/office/drawing/2010/main" val="0"/>
+              </a:ext>
+            </a:extLst>
+          </a:blip>
+          <a:srcRect/>
+          <a:stretch>
+            <a:fillRect/>
+          </a:stretch>
+        </p:blipFill>
+        <p:spPr bwMode="auto">
+          <a:xfrm>
+            <a:off x="3472384" y="3351238"/>
+            <a:ext cx="648000" cy="648000"/>
+          </a:xfrm>
+          <a:prstGeom prst="rect">
+            <a:avLst/>
+          </a:prstGeom>
+          <a:noFill/>
+          <a:extLst>
+            <a:ext uri="{909E8E84-426E-40DD-AFC4-6F175D3DCCD1}">
+              <a14:hiddenFill xmlns:a14="http://schemas.microsoft.com/office/drawing/2010/main">
+                <a:solidFill>
+                  <a:srgbClr val="FFFFFF"/>
+                </a:solidFill>
+              </a14:hiddenFill>
+            </a:ext>
+          </a:extLst>
+        </p:spPr>
+      </p:pic>
+      <p:sp>
+        <p:nvSpPr>
+          <p:cNvPr id="19" name="직사각형 18"/>
+          <p:cNvSpPr/>
+          <p:nvPr/>
+        </p:nvSpPr>
+        <p:spPr>
+          <a:xfrm>
+            <a:off x="2675106" y="3461736"/>
+            <a:ext cx="720000" cy="360000"/>
+          </a:xfrm>
+          <a:prstGeom prst="rect">
+            <a:avLst/>
+          </a:prstGeom>
+          <a:noFill/>
+          <a:ln>
+            <a:noFill/>
+          </a:ln>
+        </p:spPr>
+        <p:style>
+          <a:lnRef idx="2">
+            <a:schemeClr val="accent1">
+              <a:shade val="50000"/>
+            </a:schemeClr>
+          </a:lnRef>
+          <a:fillRef idx="1">
+            <a:schemeClr val="accent1"/>
+          </a:fillRef>
+          <a:effectRef idx="0">
+            <a:schemeClr val="accent1"/>
+          </a:effectRef>
+          <a:fontRef idx="minor">
+            <a:schemeClr val="lt1"/>
+          </a:fontRef>
+        </p:style>
+        <p:txBody>
+          <a:bodyPr rtlCol="0" anchor="ctr"/>
+          <a:lstStyle/>
+          <a:p>
+            <a:pPr algn="ctr"/>
+            <a:r>
+              <a:rPr lang="ko-KR" altLang="en-US" sz="1050" dirty="0" smtClean="0">
+                <a:solidFill>
+                  <a:srgbClr val="FF0000"/>
+                </a:solidFill>
+                <a:latin typeface="삼성긴고딕OTF Light" panose="020B0600000101010101" pitchFamily="34" charset="-127"/>
+                <a:ea typeface="삼성긴고딕OTF Light" panose="020B0600000101010101" pitchFamily="34" charset="-127"/>
+              </a:rPr>
+              <a:t>패킷</a:t>
+            </a:r>
+            <a:endParaRPr lang="ko-KR" altLang="en-US" sz="1050" dirty="0">
+              <a:solidFill>
+                <a:srgbClr val="FF0000"/>
+              </a:solidFill>
+              <a:latin typeface="삼성긴고딕OTF Light" panose="020B0600000101010101" pitchFamily="34" charset="-127"/>
+              <a:ea typeface="삼성긴고딕OTF Light" panose="020B0600000101010101" pitchFamily="34" charset="-127"/>
+            </a:endParaRPr>
+          </a:p>
+        </p:txBody>
+      </p:sp>
+      <p:sp>
+        <p:nvSpPr>
+          <p:cNvPr id="20" name="직사각형 19"/>
+          <p:cNvSpPr/>
+          <p:nvPr/>
+        </p:nvSpPr>
+        <p:spPr>
+          <a:xfrm>
+            <a:off x="2675106" y="5099620"/>
+            <a:ext cx="720000" cy="360000"/>
+          </a:xfrm>
+          <a:prstGeom prst="rect">
+            <a:avLst/>
+          </a:prstGeom>
+          <a:noFill/>
+          <a:ln>
+            <a:noFill/>
+          </a:ln>
+        </p:spPr>
+        <p:style>
+          <a:lnRef idx="2">
+            <a:schemeClr val="accent1">
+              <a:shade val="50000"/>
+            </a:schemeClr>
+          </a:lnRef>
+          <a:fillRef idx="1">
+            <a:schemeClr val="accent1"/>
+          </a:fillRef>
+          <a:effectRef idx="0">
+            <a:schemeClr val="accent1"/>
+          </a:effectRef>
+          <a:fontRef idx="minor">
+            <a:schemeClr val="lt1"/>
+          </a:fontRef>
+        </p:style>
+        <p:txBody>
+          <a:bodyPr rtlCol="0" anchor="ctr"/>
+          <a:lstStyle/>
+          <a:p>
+            <a:pPr algn="ctr"/>
+            <a:r>
+              <a:rPr lang="ko-KR" altLang="en-US" sz="1050" dirty="0" smtClean="0">
+                <a:solidFill>
+                  <a:srgbClr val="FF0000"/>
+                </a:solidFill>
+                <a:latin typeface="삼성긴고딕OTF Light" panose="020B0600000101010101" pitchFamily="34" charset="-127"/>
+                <a:ea typeface="삼성긴고딕OTF Light" panose="020B0600000101010101" pitchFamily="34" charset="-127"/>
+              </a:rPr>
+              <a:t>프레임</a:t>
+            </a:r>
+            <a:endParaRPr lang="ko-KR" altLang="en-US" sz="1050" dirty="0">
+              <a:solidFill>
+                <a:srgbClr val="FF0000"/>
+              </a:solidFill>
+              <a:latin typeface="삼성긴고딕OTF Light" panose="020B0600000101010101" pitchFamily="34" charset="-127"/>
+              <a:ea typeface="삼성긴고딕OTF Light" panose="020B0600000101010101" pitchFamily="34" charset="-127"/>
+            </a:endParaRPr>
+          </a:p>
+        </p:txBody>
+      </p:sp>
+      <p:sp>
+        <p:nvSpPr>
+          <p:cNvPr id="21" name="타원 20"/>
+          <p:cNvSpPr/>
+          <p:nvPr/>
+        </p:nvSpPr>
+        <p:spPr>
+          <a:xfrm>
+            <a:off x="536843" y="890265"/>
+            <a:ext cx="1008000" cy="432000"/>
+          </a:xfrm>
+          <a:prstGeom prst="ellipse">
+            <a:avLst/>
+          </a:prstGeom>
+          <a:solidFill>
+            <a:schemeClr val="tx2"/>
+          </a:solidFill>
+          <a:ln>
+            <a:noFill/>
+          </a:ln>
+        </p:spPr>
+        <p:style>
+          <a:lnRef idx="2">
+            <a:schemeClr val="accent1">
+              <a:shade val="50000"/>
+            </a:schemeClr>
+          </a:lnRef>
+          <a:fillRef idx="1">
+            <a:schemeClr val="accent1"/>
+          </a:fillRef>
+          <a:effectRef idx="0">
+            <a:schemeClr val="accent1"/>
+          </a:effectRef>
+          <a:fontRef idx="minor">
+            <a:schemeClr val="lt1"/>
+          </a:fontRef>
+        </p:style>
+        <p:txBody>
+          <a:bodyPr lIns="0" tIns="0" rIns="0" bIns="0" rtlCol="0" anchor="ctr"/>
+          <a:lstStyle/>
+          <a:p>
+            <a:pPr algn="ctr"/>
+            <a:r>
+              <a:rPr lang="ko-KR" altLang="en-US" sz="1000" dirty="0" err="1" smtClean="0">
+                <a:solidFill>
+                  <a:schemeClr val="bg1"/>
+                </a:solidFill>
+                <a:latin typeface="삼성긴고딕OTF Medium" panose="020B0600000101010101" pitchFamily="34" charset="-127"/>
+                <a:ea typeface="삼성긴고딕OTF Medium" panose="020B0600000101010101" pitchFamily="34" charset="-127"/>
+              </a:rPr>
+              <a:t>응용계층</a:t>
+            </a:r>
+            <a:r>
+              <a:rPr lang="en-US" altLang="ko-KR" sz="1000" dirty="0" smtClean="0">
+                <a:solidFill>
+                  <a:schemeClr val="bg1"/>
+                </a:solidFill>
+                <a:latin typeface="삼성긴고딕OTF Medium" panose="020B0600000101010101" pitchFamily="34" charset="-127"/>
+                <a:ea typeface="삼성긴고딕OTF Medium" panose="020B0600000101010101" pitchFamily="34" charset="-127"/>
+              </a:rPr>
+              <a:t/>
+            </a:r>
+            <a:br>
+              <a:rPr lang="en-US" altLang="ko-KR" sz="1000" dirty="0" smtClean="0">
+                <a:solidFill>
+                  <a:schemeClr val="bg1"/>
+                </a:solidFill>
+                <a:latin typeface="삼성긴고딕OTF Medium" panose="020B0600000101010101" pitchFamily="34" charset="-127"/>
+                <a:ea typeface="삼성긴고딕OTF Medium" panose="020B0600000101010101" pitchFamily="34" charset="-127"/>
+              </a:rPr>
+            </a:br>
+            <a:r>
+              <a:rPr lang="en-US" altLang="ko-KR" sz="1000" dirty="0" smtClean="0">
+                <a:solidFill>
+                  <a:schemeClr val="bg1"/>
+                </a:solidFill>
+                <a:latin typeface="삼성긴고딕OTF Medium" panose="020B0600000101010101" pitchFamily="34" charset="-127"/>
+                <a:ea typeface="삼성긴고딕OTF Medium" panose="020B0600000101010101" pitchFamily="34" charset="-127"/>
+              </a:rPr>
+              <a:t>(App)</a:t>
+            </a:r>
+            <a:endParaRPr lang="ko-KR" altLang="en-US" sz="1000" dirty="0">
+              <a:solidFill>
+                <a:schemeClr val="bg1"/>
+              </a:solidFill>
+              <a:latin typeface="삼성긴고딕OTF Medium" panose="020B0600000101010101" pitchFamily="34" charset="-127"/>
+              <a:ea typeface="삼성긴고딕OTF Medium" panose="020B0600000101010101" pitchFamily="34" charset="-127"/>
+            </a:endParaRPr>
+          </a:p>
+        </p:txBody>
+      </p:sp>
+      <p:sp>
+        <p:nvSpPr>
+          <p:cNvPr id="22" name="타원 21"/>
+          <p:cNvSpPr/>
+          <p:nvPr/>
+        </p:nvSpPr>
+        <p:spPr>
+          <a:xfrm>
+            <a:off x="536843" y="2186671"/>
+            <a:ext cx="1008000" cy="432000"/>
+          </a:xfrm>
+          <a:prstGeom prst="ellipse">
+            <a:avLst/>
+          </a:prstGeom>
+          <a:solidFill>
+            <a:schemeClr val="tx2"/>
+          </a:solidFill>
+          <a:ln>
+            <a:noFill/>
+          </a:ln>
+        </p:spPr>
+        <p:style>
+          <a:lnRef idx="2">
+            <a:schemeClr val="accent1">
+              <a:shade val="50000"/>
+            </a:schemeClr>
+          </a:lnRef>
+          <a:fillRef idx="1">
+            <a:schemeClr val="accent1"/>
+          </a:fillRef>
+          <a:effectRef idx="0">
+            <a:schemeClr val="accent1"/>
+          </a:effectRef>
+          <a:fontRef idx="minor">
+            <a:schemeClr val="lt1"/>
+          </a:fontRef>
+        </p:style>
+        <p:txBody>
+          <a:bodyPr lIns="0" tIns="0" rIns="0" bIns="0" rtlCol="0" anchor="ctr"/>
+          <a:lstStyle/>
+          <a:p>
+            <a:pPr algn="ctr"/>
+            <a:r>
+              <a:rPr lang="ko-KR" altLang="en-US" sz="1000" dirty="0" err="1" smtClean="0">
+                <a:solidFill>
+                  <a:schemeClr val="bg1"/>
+                </a:solidFill>
+                <a:latin typeface="삼성긴고딕OTF Medium" panose="020B0600000101010101" pitchFamily="34" charset="-127"/>
+                <a:ea typeface="삼성긴고딕OTF Medium" panose="020B0600000101010101" pitchFamily="34" charset="-127"/>
+              </a:rPr>
+              <a:t>전송계층</a:t>
+            </a:r>
+            <a:r>
+              <a:rPr lang="en-US" altLang="ko-KR" sz="1000" dirty="0" smtClean="0">
+                <a:solidFill>
+                  <a:schemeClr val="bg1"/>
+                </a:solidFill>
+                <a:latin typeface="삼성긴고딕OTF Medium" panose="020B0600000101010101" pitchFamily="34" charset="-127"/>
+                <a:ea typeface="삼성긴고딕OTF Medium" panose="020B0600000101010101" pitchFamily="34" charset="-127"/>
+              </a:rPr>
+              <a:t/>
+            </a:r>
+            <a:br>
+              <a:rPr lang="en-US" altLang="ko-KR" sz="1000" dirty="0" smtClean="0">
+                <a:solidFill>
+                  <a:schemeClr val="bg1"/>
+                </a:solidFill>
+                <a:latin typeface="삼성긴고딕OTF Medium" panose="020B0600000101010101" pitchFamily="34" charset="-127"/>
+                <a:ea typeface="삼성긴고딕OTF Medium" panose="020B0600000101010101" pitchFamily="34" charset="-127"/>
+              </a:rPr>
+            </a:br>
+            <a:r>
+              <a:rPr lang="en-US" altLang="ko-KR" sz="1000" dirty="0" smtClean="0">
+                <a:solidFill>
+                  <a:schemeClr val="bg1"/>
+                </a:solidFill>
+                <a:latin typeface="삼성긴고딕OTF Medium" panose="020B0600000101010101" pitchFamily="34" charset="-127"/>
+                <a:ea typeface="삼성긴고딕OTF Medium" panose="020B0600000101010101" pitchFamily="34" charset="-127"/>
+              </a:rPr>
+              <a:t>(TCP)</a:t>
+            </a:r>
+            <a:endParaRPr lang="ko-KR" altLang="en-US" sz="1000" dirty="0">
+              <a:solidFill>
+                <a:schemeClr val="bg1"/>
+              </a:solidFill>
+              <a:latin typeface="삼성긴고딕OTF Medium" panose="020B0600000101010101" pitchFamily="34" charset="-127"/>
+              <a:ea typeface="삼성긴고딕OTF Medium" panose="020B0600000101010101" pitchFamily="34" charset="-127"/>
+            </a:endParaRPr>
+          </a:p>
+        </p:txBody>
+      </p:sp>
+      <p:sp>
+        <p:nvSpPr>
+          <p:cNvPr id="23" name="타원 22"/>
+          <p:cNvSpPr/>
+          <p:nvPr/>
+        </p:nvSpPr>
+        <p:spPr>
+          <a:xfrm>
+            <a:off x="536843" y="3461736"/>
+            <a:ext cx="1008000" cy="432000"/>
+          </a:xfrm>
+          <a:prstGeom prst="ellipse">
+            <a:avLst/>
+          </a:prstGeom>
+          <a:solidFill>
+            <a:schemeClr val="tx2"/>
+          </a:solidFill>
+          <a:ln>
+            <a:noFill/>
+          </a:ln>
+        </p:spPr>
+        <p:style>
+          <a:lnRef idx="2">
+            <a:schemeClr val="accent1">
+              <a:shade val="50000"/>
+            </a:schemeClr>
+          </a:lnRef>
+          <a:fillRef idx="1">
+            <a:schemeClr val="accent1"/>
+          </a:fillRef>
+          <a:effectRef idx="0">
+            <a:schemeClr val="accent1"/>
+          </a:effectRef>
+          <a:fontRef idx="minor">
+            <a:schemeClr val="lt1"/>
+          </a:fontRef>
+        </p:style>
+        <p:txBody>
+          <a:bodyPr lIns="0" tIns="0" rIns="0" bIns="0" rtlCol="0" anchor="ctr"/>
+          <a:lstStyle/>
+          <a:p>
+            <a:pPr algn="ctr"/>
+            <a:r>
+              <a:rPr lang="ko-KR" altLang="en-US" sz="1000" dirty="0" err="1" smtClean="0">
+                <a:solidFill>
+                  <a:schemeClr val="bg1"/>
+                </a:solidFill>
+                <a:latin typeface="삼성긴고딕OTF Medium" panose="020B0600000101010101" pitchFamily="34" charset="-127"/>
+                <a:ea typeface="삼성긴고딕OTF Medium" panose="020B0600000101010101" pitchFamily="34" charset="-127"/>
+              </a:rPr>
+              <a:t>인터넷계층</a:t>
+            </a:r>
+            <a:r>
+              <a:rPr lang="en-US" altLang="ko-KR" sz="1000" dirty="0" smtClean="0">
+                <a:solidFill>
+                  <a:schemeClr val="bg1"/>
+                </a:solidFill>
+                <a:latin typeface="삼성긴고딕OTF Medium" panose="020B0600000101010101" pitchFamily="34" charset="-127"/>
+                <a:ea typeface="삼성긴고딕OTF Medium" panose="020B0600000101010101" pitchFamily="34" charset="-127"/>
+              </a:rPr>
+              <a:t/>
+            </a:r>
+            <a:br>
+              <a:rPr lang="en-US" altLang="ko-KR" sz="1000" dirty="0" smtClean="0">
+                <a:solidFill>
+                  <a:schemeClr val="bg1"/>
+                </a:solidFill>
+                <a:latin typeface="삼성긴고딕OTF Medium" panose="020B0600000101010101" pitchFamily="34" charset="-127"/>
+                <a:ea typeface="삼성긴고딕OTF Medium" panose="020B0600000101010101" pitchFamily="34" charset="-127"/>
+              </a:rPr>
+            </a:br>
+            <a:r>
+              <a:rPr lang="en-US" altLang="ko-KR" sz="1000" dirty="0" smtClean="0">
+                <a:solidFill>
+                  <a:schemeClr val="bg1"/>
+                </a:solidFill>
+                <a:latin typeface="삼성긴고딕OTF Medium" panose="020B0600000101010101" pitchFamily="34" charset="-127"/>
+                <a:ea typeface="삼성긴고딕OTF Medium" panose="020B0600000101010101" pitchFamily="34" charset="-127"/>
+              </a:rPr>
+              <a:t>(IP)</a:t>
+            </a:r>
+            <a:endParaRPr lang="ko-KR" altLang="en-US" sz="1000" dirty="0">
+              <a:solidFill>
+                <a:schemeClr val="bg1"/>
+              </a:solidFill>
+              <a:latin typeface="삼성긴고딕OTF Medium" panose="020B0600000101010101" pitchFamily="34" charset="-127"/>
+              <a:ea typeface="삼성긴고딕OTF Medium" panose="020B0600000101010101" pitchFamily="34" charset="-127"/>
+            </a:endParaRPr>
+          </a:p>
+        </p:txBody>
+      </p:sp>
+      <p:sp>
+        <p:nvSpPr>
+          <p:cNvPr id="24" name="타원 23"/>
+          <p:cNvSpPr/>
+          <p:nvPr/>
+        </p:nvSpPr>
+        <p:spPr>
+          <a:xfrm>
+            <a:off x="536843" y="4513429"/>
+            <a:ext cx="1008000" cy="432000"/>
+          </a:xfrm>
+          <a:prstGeom prst="ellipse">
+            <a:avLst/>
+          </a:prstGeom>
+          <a:solidFill>
+            <a:schemeClr val="tx2"/>
+          </a:solidFill>
+          <a:ln>
+            <a:noFill/>
+          </a:ln>
+        </p:spPr>
+        <p:style>
+          <a:lnRef idx="2">
+            <a:schemeClr val="accent1">
+              <a:shade val="50000"/>
+            </a:schemeClr>
+          </a:lnRef>
+          <a:fillRef idx="1">
+            <a:schemeClr val="accent1"/>
+          </a:fillRef>
+          <a:effectRef idx="0">
+            <a:schemeClr val="accent1"/>
+          </a:effectRef>
+          <a:fontRef idx="minor">
+            <a:schemeClr val="lt1"/>
+          </a:fontRef>
+        </p:style>
+        <p:txBody>
+          <a:bodyPr lIns="0" tIns="0" rIns="0" bIns="0" rtlCol="0" anchor="ctr"/>
+          <a:lstStyle/>
+          <a:p>
+            <a:pPr algn="ctr"/>
+            <a:r>
+              <a:rPr lang="ko-KR" altLang="en-US" sz="1000" dirty="0" smtClean="0">
+                <a:solidFill>
+                  <a:schemeClr val="bg1"/>
+                </a:solidFill>
+                <a:latin typeface="삼성긴고딕OTF Medium" panose="020B0600000101010101" pitchFamily="34" charset="-127"/>
+                <a:ea typeface="삼성긴고딕OTF Medium" panose="020B0600000101010101" pitchFamily="34" charset="-127"/>
+              </a:rPr>
+              <a:t>네트워크계층</a:t>
+            </a:r>
+            <a:r>
+              <a:rPr lang="en-US" altLang="ko-KR" sz="1000" dirty="0">
+                <a:solidFill>
+                  <a:schemeClr val="bg1"/>
+                </a:solidFill>
+                <a:latin typeface="삼성긴고딕OTF Medium" panose="020B0600000101010101" pitchFamily="34" charset="-127"/>
+                <a:ea typeface="삼성긴고딕OTF Medium" panose="020B0600000101010101" pitchFamily="34" charset="-127"/>
+              </a:rPr>
+              <a:t/>
+            </a:r>
+            <a:br>
+              <a:rPr lang="en-US" altLang="ko-KR" sz="1000" dirty="0">
+                <a:solidFill>
+                  <a:schemeClr val="bg1"/>
+                </a:solidFill>
+                <a:latin typeface="삼성긴고딕OTF Medium" panose="020B0600000101010101" pitchFamily="34" charset="-127"/>
+                <a:ea typeface="삼성긴고딕OTF Medium" panose="020B0600000101010101" pitchFamily="34" charset="-127"/>
+              </a:rPr>
+            </a:br>
+            <a:r>
+              <a:rPr lang="en-US" altLang="ko-KR" sz="1000" dirty="0" smtClean="0">
+                <a:solidFill>
+                  <a:schemeClr val="bg1"/>
+                </a:solidFill>
+                <a:latin typeface="삼성긴고딕OTF Medium" panose="020B0600000101010101" pitchFamily="34" charset="-127"/>
+                <a:ea typeface="삼성긴고딕OTF Medium" panose="020B0600000101010101" pitchFamily="34" charset="-127"/>
+              </a:rPr>
+              <a:t>(Ethernet)</a:t>
+            </a:r>
+            <a:endParaRPr lang="ko-KR" altLang="en-US" sz="1000" dirty="0">
+              <a:solidFill>
+                <a:schemeClr val="bg1"/>
+              </a:solidFill>
+              <a:latin typeface="삼성긴고딕OTF Medium" panose="020B0600000101010101" pitchFamily="34" charset="-127"/>
+              <a:ea typeface="삼성긴고딕OTF Medium" panose="020B0600000101010101" pitchFamily="34" charset="-127"/>
+            </a:endParaRPr>
+          </a:p>
+        </p:txBody>
+      </p:sp>
+    </p:spTree>
+    <p:extLst>
+      <p:ext uri="{BB962C8B-B14F-4D97-AF65-F5344CB8AC3E}">
+        <p14:creationId xmlns:p14="http://schemas.microsoft.com/office/powerpoint/2010/main" val="3827336538"/>
       </p:ext>
     </p:extLst>
   </p:cSld>

</xml_diff>